<commit_message>
08.Adaptive Design - presentation update
</commit_message>
<xml_diff>
--- a/08-Adaptive-Design/09-Adaptive-Design.pptx
+++ b/08-Adaptive-Design/09-Adaptive-Design.pptx
@@ -5,21 +5,26 @@
     <p:sldMasterId id="2147483648" r:id="rId1"/>
   </p:sldMasterIdLst>
   <p:notesMasterIdLst>
-    <p:notesMasterId r:id="rId14"/>
+    <p:notesMasterId r:id="rId19"/>
   </p:notesMasterIdLst>
   <p:sldIdLst>
     <p:sldId id="256" r:id="rId2"/>
     <p:sldId id="290" r:id="rId3"/>
-    <p:sldId id="291" r:id="rId4"/>
-    <p:sldId id="292" r:id="rId5"/>
-    <p:sldId id="294" r:id="rId6"/>
-    <p:sldId id="293" r:id="rId7"/>
-    <p:sldId id="295" r:id="rId8"/>
-    <p:sldId id="296" r:id="rId9"/>
-    <p:sldId id="297" r:id="rId10"/>
-    <p:sldId id="298" r:id="rId11"/>
-    <p:sldId id="265" r:id="rId12"/>
-    <p:sldId id="269" r:id="rId13"/>
+    <p:sldId id="304" r:id="rId4"/>
+    <p:sldId id="291" r:id="rId5"/>
+    <p:sldId id="292" r:id="rId6"/>
+    <p:sldId id="294" r:id="rId7"/>
+    <p:sldId id="299" r:id="rId8"/>
+    <p:sldId id="300" r:id="rId9"/>
+    <p:sldId id="301" r:id="rId10"/>
+    <p:sldId id="302" r:id="rId11"/>
+    <p:sldId id="303" r:id="rId12"/>
+    <p:sldId id="295" r:id="rId13"/>
+    <p:sldId id="297" r:id="rId14"/>
+    <p:sldId id="296" r:id="rId15"/>
+    <p:sldId id="298" r:id="rId16"/>
+    <p:sldId id="265" r:id="rId17"/>
+    <p:sldId id="269" r:id="rId18"/>
   </p:sldIdLst>
   <p:sldSz cx="9144000" cy="6858000" type="screen4x3"/>
   <p:notesSz cx="6858000" cy="9144000"/>
@@ -231,7 +236,7 @@
           <a:p>
             <a:fld id="{2E054F57-E93D-4CC3-8A27-2F256E70BB98}" type="datetimeFigureOut">
               <a:rPr lang="en-US" smtClean="0"/>
-              <a:t>22 Aug 15</a:t>
+              <a:t>6/25/2016</a:t>
             </a:fld>
             <a:endParaRPr lang="en-US"/>
           </a:p>
@@ -680,7 +685,7 @@
           <a:p>
             <a:fld id="{3EA744D9-3FBE-48D8-BF2A-85DF203E4D20}" type="datetimeFigureOut">
               <a:rPr lang="bg-BG" smtClean="0"/>
-              <a:t>22.8.2015 г.</a:t>
+              <a:t>25.6.2016 г.</a:t>
             </a:fld>
             <a:endParaRPr lang="bg-BG"/>
           </a:p>
@@ -850,7 +855,7 @@
           <a:p>
             <a:fld id="{3EA744D9-3FBE-48D8-BF2A-85DF203E4D20}" type="datetimeFigureOut">
               <a:rPr lang="bg-BG" smtClean="0"/>
-              <a:t>22.8.2015 г.</a:t>
+              <a:t>25.6.2016 г.</a:t>
             </a:fld>
             <a:endParaRPr lang="bg-BG"/>
           </a:p>
@@ -1030,7 +1035,7 @@
           <a:p>
             <a:fld id="{3EA744D9-3FBE-48D8-BF2A-85DF203E4D20}" type="datetimeFigureOut">
               <a:rPr lang="bg-BG" smtClean="0"/>
-              <a:t>22.8.2015 г.</a:t>
+              <a:t>25.6.2016 г.</a:t>
             </a:fld>
             <a:endParaRPr lang="bg-BG"/>
           </a:p>
@@ -1200,7 +1205,7 @@
           <a:p>
             <a:fld id="{3EA744D9-3FBE-48D8-BF2A-85DF203E4D20}" type="datetimeFigureOut">
               <a:rPr lang="bg-BG" smtClean="0"/>
-              <a:t>22.8.2015 г.</a:t>
+              <a:t>25.6.2016 г.</a:t>
             </a:fld>
             <a:endParaRPr lang="bg-BG"/>
           </a:p>
@@ -1446,7 +1451,7 @@
           <a:p>
             <a:fld id="{3EA744D9-3FBE-48D8-BF2A-85DF203E4D20}" type="datetimeFigureOut">
               <a:rPr lang="bg-BG" smtClean="0"/>
-              <a:t>22.8.2015 г.</a:t>
+              <a:t>25.6.2016 г.</a:t>
             </a:fld>
             <a:endParaRPr lang="bg-BG"/>
           </a:p>
@@ -1734,7 +1739,7 @@
           <a:p>
             <a:fld id="{3EA744D9-3FBE-48D8-BF2A-85DF203E4D20}" type="datetimeFigureOut">
               <a:rPr lang="bg-BG" smtClean="0"/>
-              <a:t>22.8.2015 г.</a:t>
+              <a:t>25.6.2016 г.</a:t>
             </a:fld>
             <a:endParaRPr lang="bg-BG"/>
           </a:p>
@@ -2156,7 +2161,7 @@
           <a:p>
             <a:fld id="{3EA744D9-3FBE-48D8-BF2A-85DF203E4D20}" type="datetimeFigureOut">
               <a:rPr lang="bg-BG" smtClean="0"/>
-              <a:t>22.8.2015 г.</a:t>
+              <a:t>25.6.2016 г.</a:t>
             </a:fld>
             <a:endParaRPr lang="bg-BG"/>
           </a:p>
@@ -2274,7 +2279,7 @@
           <a:p>
             <a:fld id="{3EA744D9-3FBE-48D8-BF2A-85DF203E4D20}" type="datetimeFigureOut">
               <a:rPr lang="bg-BG" smtClean="0"/>
-              <a:t>22.8.2015 г.</a:t>
+              <a:t>25.6.2016 г.</a:t>
             </a:fld>
             <a:endParaRPr lang="bg-BG"/>
           </a:p>
@@ -2369,7 +2374,7 @@
           <a:p>
             <a:fld id="{3EA744D9-3FBE-48D8-BF2A-85DF203E4D20}" type="datetimeFigureOut">
               <a:rPr lang="bg-BG" smtClean="0"/>
-              <a:t>22.8.2015 г.</a:t>
+              <a:t>25.6.2016 г.</a:t>
             </a:fld>
             <a:endParaRPr lang="bg-BG"/>
           </a:p>
@@ -2646,7 +2651,7 @@
           <a:p>
             <a:fld id="{3EA744D9-3FBE-48D8-BF2A-85DF203E4D20}" type="datetimeFigureOut">
               <a:rPr lang="bg-BG" smtClean="0"/>
-              <a:t>22.8.2015 г.</a:t>
+              <a:t>25.6.2016 г.</a:t>
             </a:fld>
             <a:endParaRPr lang="bg-BG"/>
           </a:p>
@@ -2899,7 +2904,7 @@
           <a:p>
             <a:fld id="{3EA744D9-3FBE-48D8-BF2A-85DF203E4D20}" type="datetimeFigureOut">
               <a:rPr lang="bg-BG" smtClean="0"/>
-              <a:t>22.8.2015 г.</a:t>
+              <a:t>25.6.2016 г.</a:t>
             </a:fld>
             <a:endParaRPr lang="bg-BG"/>
           </a:p>
@@ -3121,7 +3126,7 @@
           <a:p>
             <a:fld id="{3EA744D9-3FBE-48D8-BF2A-85DF203E4D20}" type="datetimeFigureOut">
               <a:rPr lang="bg-BG" smtClean="0"/>
-              <a:t>22.8.2015 г.</a:t>
+              <a:t>25.6.2016 г.</a:t>
             </a:fld>
             <a:endParaRPr lang="bg-BG"/>
           </a:p>
@@ -3584,6 +3589,1885 @@
         </p:spPr>
         <p:txBody>
           <a:bodyPr>
+            <a:normAutofit/>
+          </a:bodyPr>
+          <a:lstStyle/>
+          <a:p>
+            <a:pPr algn="l"/>
+            <a:r>
+              <a:rPr lang="en-US" dirty="0" smtClean="0">
+                <a:solidFill>
+                  <a:schemeClr val="accent6"/>
+                </a:solidFill>
+              </a:rPr>
+              <a:t>Flexible type</a:t>
+            </a:r>
+            <a:endParaRPr lang="bg-BG" dirty="0">
+              <a:solidFill>
+                <a:schemeClr val="accent6"/>
+              </a:solidFill>
+            </a:endParaRPr>
+          </a:p>
+        </p:txBody>
+      </p:sp>
+      <p:sp>
+        <p:nvSpPr>
+          <p:cNvPr id="6" name="Content Placeholder 5"/>
+          <p:cNvSpPr>
+            <a:spLocks noGrp="1"/>
+          </p:cNvSpPr>
+          <p:nvPr>
+            <p:ph idx="1"/>
+          </p:nvPr>
+        </p:nvSpPr>
+        <p:spPr>
+          <a:xfrm>
+            <a:off x="457200" y="1600200"/>
+            <a:ext cx="8229600" cy="4876799"/>
+          </a:xfrm>
+        </p:spPr>
+        <p:txBody>
+          <a:bodyPr>
+            <a:normAutofit lnSpcReduction="10000"/>
+          </a:bodyPr>
+          <a:lstStyle/>
+          <a:p>
+            <a:pPr marL="0" indent="0">
+              <a:buNone/>
+            </a:pPr>
+            <a:r>
+              <a:rPr lang="bg-BG" dirty="0" smtClean="0">
+                <a:solidFill>
+                  <a:schemeClr val="bg1"/>
+                </a:solidFill>
+              </a:rPr>
+              <a:t>Използване на пропорционален </a:t>
+            </a:r>
+            <a:r>
+              <a:rPr lang="en-US" dirty="0" smtClean="0">
+                <a:solidFill>
+                  <a:schemeClr val="bg1"/>
+                </a:solidFill>
+              </a:rPr>
+              <a:t>font-size</a:t>
+            </a:r>
+            <a:r>
+              <a:rPr lang="bg-BG" dirty="0" smtClean="0">
+                <a:solidFill>
+                  <a:schemeClr val="bg1"/>
+                </a:solidFill>
+              </a:rPr>
+              <a:t> спрямо родителя</a:t>
+            </a:r>
+            <a:br>
+              <a:rPr lang="bg-BG" dirty="0" smtClean="0">
+                <a:solidFill>
+                  <a:schemeClr val="bg1"/>
+                </a:solidFill>
+              </a:rPr>
+            </a:br>
+            <a:r>
+              <a:rPr lang="bg-BG" dirty="0" smtClean="0">
+                <a:solidFill>
+                  <a:schemeClr val="bg1"/>
+                </a:solidFill>
+              </a:rPr>
+              <a:t/>
+            </a:r>
+            <a:br>
+              <a:rPr lang="bg-BG" dirty="0" smtClean="0">
+                <a:solidFill>
+                  <a:schemeClr val="bg1"/>
+                </a:solidFill>
+              </a:rPr>
+            </a:br>
+            <a:r>
+              <a:rPr lang="bg-BG" dirty="0" smtClean="0">
+                <a:solidFill>
+                  <a:srgbClr val="00B050"/>
+                </a:solidFill>
+              </a:rPr>
+              <a:t>Работа с </a:t>
+            </a:r>
+            <a:r>
+              <a:rPr lang="en-US" dirty="0" err="1" smtClean="0">
+                <a:solidFill>
+                  <a:srgbClr val="00B050"/>
+                </a:solidFill>
+              </a:rPr>
+              <a:t>em</a:t>
+            </a:r>
+            <a:r>
+              <a:rPr lang="en-US" dirty="0" smtClean="0">
+                <a:solidFill>
+                  <a:srgbClr val="00B050"/>
+                </a:solidFill>
+              </a:rPr>
+              <a:t> </a:t>
+            </a:r>
+          </a:p>
+          <a:p>
+            <a:pPr marL="0" indent="0">
+              <a:buNone/>
+            </a:pPr>
+            <a:r>
+              <a:rPr lang="en-US" dirty="0">
+                <a:solidFill>
+                  <a:schemeClr val="bg1"/>
+                </a:solidFill>
+              </a:rPr>
+              <a:t/>
+            </a:r>
+            <a:br>
+              <a:rPr lang="en-US" dirty="0">
+                <a:solidFill>
+                  <a:schemeClr val="bg1"/>
+                </a:solidFill>
+              </a:rPr>
+            </a:br>
+            <a:r>
+              <a:rPr lang="en-US" dirty="0">
+                <a:solidFill>
+                  <a:schemeClr val="bg1"/>
+                </a:solidFill>
+              </a:rPr>
+              <a:t>ems = target / root</a:t>
+            </a:r>
+          </a:p>
+          <a:p>
+            <a:pPr marL="0" indent="0">
+              <a:buNone/>
+            </a:pPr>
+            <a:r>
+              <a:rPr lang="en-US" dirty="0">
+                <a:solidFill>
+                  <a:schemeClr val="bg1"/>
+                </a:solidFill>
+              </a:rPr>
+              <a:t>1.4375em = 23px / 16px</a:t>
+            </a:r>
+          </a:p>
+          <a:p>
+            <a:pPr marL="0" indent="0">
+              <a:buNone/>
+            </a:pPr>
+            <a:r>
+              <a:rPr lang="bg-BG" dirty="0" smtClean="0">
+                <a:solidFill>
+                  <a:schemeClr val="bg1"/>
+                </a:solidFill>
+              </a:rPr>
+              <a:t/>
+            </a:r>
+            <a:br>
+              <a:rPr lang="bg-BG" dirty="0" smtClean="0">
+                <a:solidFill>
+                  <a:schemeClr val="bg1"/>
+                </a:solidFill>
+              </a:rPr>
+            </a:br>
+            <a:r>
+              <a:rPr lang="bg-BG" dirty="0" smtClean="0">
+                <a:solidFill>
+                  <a:schemeClr val="bg1"/>
+                </a:solidFill>
+              </a:rPr>
+              <a:t/>
+            </a:r>
+            <a:br>
+              <a:rPr lang="bg-BG" dirty="0" smtClean="0">
+                <a:solidFill>
+                  <a:schemeClr val="bg1"/>
+                </a:solidFill>
+              </a:rPr>
+            </a:br>
+            <a:endParaRPr lang="bg-BG" dirty="0" smtClean="0">
+              <a:solidFill>
+                <a:schemeClr val="bg1"/>
+              </a:solidFill>
+            </a:endParaRPr>
+          </a:p>
+          <a:p>
+            <a:pPr marL="0" indent="0">
+              <a:buNone/>
+            </a:pPr>
+            <a:endParaRPr lang="en-US" dirty="0">
+              <a:solidFill>
+                <a:schemeClr val="bg1"/>
+              </a:solidFill>
+            </a:endParaRPr>
+          </a:p>
+        </p:txBody>
+      </p:sp>
+    </p:spTree>
+    <p:extLst>
+      <p:ext uri="{BB962C8B-B14F-4D97-AF65-F5344CB8AC3E}">
+        <p14:creationId xmlns:p14="http://schemas.microsoft.com/office/powerpoint/2010/main" val="275671974"/>
+      </p:ext>
+    </p:extLst>
+  </p:cSld>
+  <p:clrMapOvr>
+    <a:masterClrMapping/>
+  </p:clrMapOvr>
+  <p:timing>
+    <p:tnLst>
+      <p:par>
+        <p:cTn id="1" dur="indefinite" restart="never" nodeType="tmRoot"/>
+      </p:par>
+    </p:tnLst>
+  </p:timing>
+</p:sld>
+</file>
+
+<file path=ppt/slides/slide11.xml><?xml version="1.0" encoding="utf-8"?>
+<p:sld xmlns:a="http://schemas.openxmlformats.org/drawingml/2006/main" xmlns:r="http://schemas.openxmlformats.org/officeDocument/2006/relationships" xmlns:p="http://schemas.openxmlformats.org/presentationml/2006/main">
+  <p:cSld>
+    <p:spTree>
+      <p:nvGrpSpPr>
+        <p:cNvPr id="1" name=""/>
+        <p:cNvGrpSpPr/>
+        <p:nvPr/>
+      </p:nvGrpSpPr>
+      <p:grpSpPr>
+        <a:xfrm>
+          <a:off x="0" y="0"/>
+          <a:ext cx="0" cy="0"/>
+          <a:chOff x="0" y="0"/>
+          <a:chExt cx="0" cy="0"/>
+        </a:xfrm>
+      </p:grpSpPr>
+      <p:sp>
+        <p:nvSpPr>
+          <p:cNvPr id="2" name="Title 1"/>
+          <p:cNvSpPr>
+            <a:spLocks noGrp="1"/>
+          </p:cNvSpPr>
+          <p:nvPr>
+            <p:ph type="title"/>
+          </p:nvPr>
+        </p:nvSpPr>
+        <p:spPr>
+          <a:xfrm>
+            <a:off x="457200" y="685800"/>
+            <a:ext cx="8610600" cy="1143000"/>
+          </a:xfrm>
+        </p:spPr>
+        <p:txBody>
+          <a:bodyPr>
+            <a:normAutofit/>
+          </a:bodyPr>
+          <a:lstStyle/>
+          <a:p>
+            <a:pPr algn="l"/>
+            <a:r>
+              <a:rPr lang="en-US" dirty="0" smtClean="0">
+                <a:solidFill>
+                  <a:schemeClr val="accent6"/>
+                </a:solidFill>
+              </a:rPr>
+              <a:t>Flexible type</a:t>
+            </a:r>
+            <a:endParaRPr lang="bg-BG" dirty="0">
+              <a:solidFill>
+                <a:schemeClr val="accent6"/>
+              </a:solidFill>
+            </a:endParaRPr>
+          </a:p>
+        </p:txBody>
+      </p:sp>
+      <p:sp>
+        <p:nvSpPr>
+          <p:cNvPr id="6" name="Content Placeholder 5"/>
+          <p:cNvSpPr>
+            <a:spLocks noGrp="1"/>
+          </p:cNvSpPr>
+          <p:nvPr>
+            <p:ph idx="1"/>
+          </p:nvPr>
+        </p:nvSpPr>
+        <p:spPr>
+          <a:xfrm>
+            <a:off x="457200" y="1600200"/>
+            <a:ext cx="8229600" cy="4876799"/>
+          </a:xfrm>
+        </p:spPr>
+        <p:txBody>
+          <a:bodyPr>
+            <a:normAutofit/>
+          </a:bodyPr>
+          <a:lstStyle/>
+          <a:p>
+            <a:pPr marL="0" indent="0">
+              <a:buNone/>
+            </a:pPr>
+            <a:r>
+              <a:rPr lang="bg-BG" dirty="0" smtClean="0">
+                <a:solidFill>
+                  <a:schemeClr val="bg1"/>
+                </a:solidFill>
+              </a:rPr>
+              <a:t>Използване на пропорционален </a:t>
+            </a:r>
+            <a:r>
+              <a:rPr lang="en-US" dirty="0" smtClean="0">
+                <a:solidFill>
+                  <a:schemeClr val="bg1"/>
+                </a:solidFill>
+              </a:rPr>
+              <a:t>font-size</a:t>
+            </a:r>
+            <a:r>
+              <a:rPr lang="bg-BG" dirty="0" smtClean="0">
+                <a:solidFill>
+                  <a:schemeClr val="bg1"/>
+                </a:solidFill>
+              </a:rPr>
+              <a:t> спрямо родителя</a:t>
+            </a:r>
+            <a:br>
+              <a:rPr lang="bg-BG" dirty="0" smtClean="0">
+                <a:solidFill>
+                  <a:schemeClr val="bg1"/>
+                </a:solidFill>
+              </a:rPr>
+            </a:br>
+            <a:r>
+              <a:rPr lang="bg-BG" dirty="0" smtClean="0">
+                <a:solidFill>
+                  <a:schemeClr val="bg1"/>
+                </a:solidFill>
+              </a:rPr>
+              <a:t/>
+            </a:r>
+            <a:br>
+              <a:rPr lang="bg-BG" dirty="0" smtClean="0">
+                <a:solidFill>
+                  <a:schemeClr val="bg1"/>
+                </a:solidFill>
+              </a:rPr>
+            </a:br>
+            <a:endParaRPr lang="bg-BG" dirty="0" smtClean="0">
+              <a:solidFill>
+                <a:schemeClr val="bg1"/>
+              </a:solidFill>
+            </a:endParaRPr>
+          </a:p>
+          <a:p>
+            <a:pPr marL="0" indent="0">
+              <a:buNone/>
+            </a:pPr>
+            <a:endParaRPr lang="en-US" dirty="0">
+              <a:solidFill>
+                <a:schemeClr val="bg1"/>
+              </a:solidFill>
+            </a:endParaRPr>
+          </a:p>
+        </p:txBody>
+      </p:sp>
+      <p:sp>
+        <p:nvSpPr>
+          <p:cNvPr id="3" name="Rounded Rectangle 2"/>
+          <p:cNvSpPr/>
+          <p:nvPr/>
+        </p:nvSpPr>
+        <p:spPr>
+          <a:xfrm>
+            <a:off x="228600" y="3048000"/>
+            <a:ext cx="3938788" cy="3124200"/>
+          </a:xfrm>
+          <a:prstGeom prst="roundRect">
+            <a:avLst/>
+          </a:prstGeom>
+        </p:spPr>
+        <p:style>
+          <a:lnRef idx="2">
+            <a:schemeClr val="accent1">
+              <a:shade val="50000"/>
+            </a:schemeClr>
+          </a:lnRef>
+          <a:fillRef idx="1">
+            <a:schemeClr val="accent1"/>
+          </a:fillRef>
+          <a:effectRef idx="0">
+            <a:schemeClr val="accent1"/>
+          </a:effectRef>
+          <a:fontRef idx="minor">
+            <a:schemeClr val="lt1"/>
+          </a:fontRef>
+        </p:style>
+        <p:txBody>
+          <a:bodyPr rtlCol="0" anchor="ctr"/>
+          <a:lstStyle/>
+          <a:p>
+            <a:pPr fontAlgn="base">
+              <a:spcAft>
+                <a:spcPct val="0"/>
+              </a:spcAft>
+              <a:buClr>
+                <a:schemeClr val="accent5">
+                  <a:lumMod val="40000"/>
+                  <a:lumOff val="60000"/>
+                </a:schemeClr>
+              </a:buClr>
+              <a:buSzPct val="70000"/>
+              <a:buFont typeface="Wingdings 2" pitchFamily="18" charset="2"/>
+              <a:buNone/>
+            </a:pPr>
+            <a:r>
+              <a:rPr lang="en-US" b="1" dirty="0">
+                <a:solidFill>
+                  <a:srgbClr val="8CF4F2"/>
+                </a:solidFill>
+                <a:effectLst>
+                  <a:outerShdw blurRad="38100" dist="38100" dir="2700000" algn="tl">
+                    <a:srgbClr val="000000">
+                      <a:alpha val="43137"/>
+                    </a:srgbClr>
+                  </a:outerShdw>
+                </a:effectLst>
+                <a:latin typeface="Consolas" pitchFamily="49" charset="0"/>
+                <a:cs typeface="Consolas" pitchFamily="49" charset="0"/>
+              </a:rPr>
+              <a:t>body{ </a:t>
+            </a:r>
+            <a:endParaRPr lang="en-US" b="1" dirty="0" smtClean="0">
+              <a:solidFill>
+                <a:srgbClr val="8CF4F2"/>
+              </a:solidFill>
+              <a:effectLst>
+                <a:outerShdw blurRad="38100" dist="38100" dir="2700000" algn="tl">
+                  <a:srgbClr val="000000">
+                    <a:alpha val="43137"/>
+                  </a:srgbClr>
+                </a:outerShdw>
+              </a:effectLst>
+              <a:latin typeface="Consolas" pitchFamily="49" charset="0"/>
+              <a:cs typeface="Consolas" pitchFamily="49" charset="0"/>
+            </a:endParaRPr>
+          </a:p>
+          <a:p>
+            <a:pPr fontAlgn="base">
+              <a:spcAft>
+                <a:spcPct val="0"/>
+              </a:spcAft>
+              <a:buClr>
+                <a:schemeClr val="accent5">
+                  <a:lumMod val="40000"/>
+                  <a:lumOff val="60000"/>
+                </a:schemeClr>
+              </a:buClr>
+              <a:buSzPct val="70000"/>
+              <a:buFont typeface="Wingdings 2" pitchFamily="18" charset="2"/>
+              <a:buNone/>
+            </a:pPr>
+            <a:r>
+              <a:rPr lang="en-US" b="1" dirty="0">
+                <a:solidFill>
+                  <a:srgbClr val="8CF4F2"/>
+                </a:solidFill>
+                <a:effectLst>
+                  <a:outerShdw blurRad="38100" dist="38100" dir="2700000" algn="tl">
+                    <a:srgbClr val="000000">
+                      <a:alpha val="43137"/>
+                    </a:srgbClr>
+                  </a:outerShdw>
+                </a:effectLst>
+                <a:latin typeface="Consolas" pitchFamily="49" charset="0"/>
+                <a:cs typeface="Consolas" pitchFamily="49" charset="0"/>
+              </a:rPr>
+              <a:t>	</a:t>
+            </a:r>
+            <a:r>
+              <a:rPr lang="en-US" b="1" dirty="0" smtClean="0">
+                <a:solidFill>
+                  <a:srgbClr val="8CF4F2"/>
+                </a:solidFill>
+                <a:effectLst>
+                  <a:outerShdw blurRad="38100" dist="38100" dir="2700000" algn="tl">
+                    <a:srgbClr val="000000">
+                      <a:alpha val="43137"/>
+                    </a:srgbClr>
+                  </a:outerShdw>
+                </a:effectLst>
+                <a:latin typeface="Consolas" pitchFamily="49" charset="0"/>
+                <a:cs typeface="Consolas" pitchFamily="49" charset="0"/>
+              </a:rPr>
+              <a:t>font-size:16px;</a:t>
+            </a:r>
+          </a:p>
+          <a:p>
+            <a:pPr fontAlgn="base">
+              <a:spcAft>
+                <a:spcPct val="0"/>
+              </a:spcAft>
+              <a:buClr>
+                <a:schemeClr val="accent5">
+                  <a:lumMod val="40000"/>
+                  <a:lumOff val="60000"/>
+                </a:schemeClr>
+              </a:buClr>
+              <a:buSzPct val="70000"/>
+              <a:buFont typeface="Wingdings 2" pitchFamily="18" charset="2"/>
+              <a:buNone/>
+            </a:pPr>
+            <a:r>
+              <a:rPr lang="en-US" b="1" dirty="0" smtClean="0">
+                <a:solidFill>
+                  <a:srgbClr val="8CF4F2"/>
+                </a:solidFill>
+                <a:effectLst>
+                  <a:outerShdw blurRad="38100" dist="38100" dir="2700000" algn="tl">
+                    <a:srgbClr val="000000">
+                      <a:alpha val="43137"/>
+                    </a:srgbClr>
+                  </a:outerShdw>
+                </a:effectLst>
+                <a:latin typeface="Consolas" pitchFamily="49" charset="0"/>
+                <a:cs typeface="Consolas" pitchFamily="49" charset="0"/>
+              </a:rPr>
+              <a:t>}  </a:t>
+            </a:r>
+            <a:endParaRPr lang="en-US" b="1" dirty="0">
+              <a:solidFill>
+                <a:srgbClr val="8CF4F2"/>
+              </a:solidFill>
+              <a:effectLst>
+                <a:outerShdw blurRad="38100" dist="38100" dir="2700000" algn="tl">
+                  <a:srgbClr val="000000">
+                    <a:alpha val="43137"/>
+                  </a:srgbClr>
+                </a:outerShdw>
+              </a:effectLst>
+              <a:latin typeface="Consolas" pitchFamily="49" charset="0"/>
+              <a:cs typeface="Consolas" pitchFamily="49" charset="0"/>
+            </a:endParaRPr>
+          </a:p>
+          <a:p>
+            <a:pPr fontAlgn="base">
+              <a:spcAft>
+                <a:spcPct val="0"/>
+              </a:spcAft>
+              <a:buClr>
+                <a:schemeClr val="accent5">
+                  <a:lumMod val="40000"/>
+                  <a:lumOff val="60000"/>
+                </a:schemeClr>
+              </a:buClr>
+              <a:buSzPct val="70000"/>
+              <a:buFont typeface="Wingdings 2" pitchFamily="18" charset="2"/>
+              <a:buNone/>
+            </a:pPr>
+            <a:r>
+              <a:rPr lang="en-US" b="1" dirty="0" smtClean="0">
+                <a:solidFill>
+                  <a:srgbClr val="8CF4F2"/>
+                </a:solidFill>
+                <a:effectLst>
+                  <a:outerShdw blurRad="38100" dist="38100" dir="2700000" algn="tl">
+                    <a:srgbClr val="000000">
+                      <a:alpha val="43137"/>
+                    </a:srgbClr>
+                  </a:outerShdw>
+                </a:effectLst>
+                <a:latin typeface="Consolas" pitchFamily="49" charset="0"/>
+                <a:cs typeface="Consolas" pitchFamily="49" charset="0"/>
+              </a:rPr>
+              <a:t>body </a:t>
+            </a:r>
+            <a:r>
+              <a:rPr lang="en-US" b="1" dirty="0">
+                <a:solidFill>
+                  <a:srgbClr val="8CF4F2"/>
+                </a:solidFill>
+                <a:effectLst>
+                  <a:outerShdw blurRad="38100" dist="38100" dir="2700000" algn="tl">
+                    <a:srgbClr val="000000">
+                      <a:alpha val="43137"/>
+                    </a:srgbClr>
+                  </a:outerShdw>
+                </a:effectLst>
+                <a:latin typeface="Consolas" pitchFamily="49" charset="0"/>
+                <a:cs typeface="Consolas" pitchFamily="49" charset="0"/>
+              </a:rPr>
+              <a:t>header{ </a:t>
+            </a:r>
+            <a:endParaRPr lang="en-US" b="1" dirty="0" smtClean="0">
+              <a:solidFill>
+                <a:srgbClr val="8CF4F2"/>
+              </a:solidFill>
+              <a:effectLst>
+                <a:outerShdw blurRad="38100" dist="38100" dir="2700000" algn="tl">
+                  <a:srgbClr val="000000">
+                    <a:alpha val="43137"/>
+                  </a:srgbClr>
+                </a:outerShdw>
+              </a:effectLst>
+              <a:latin typeface="Consolas" pitchFamily="49" charset="0"/>
+              <a:cs typeface="Consolas" pitchFamily="49" charset="0"/>
+            </a:endParaRPr>
+          </a:p>
+          <a:p>
+            <a:pPr fontAlgn="base">
+              <a:spcAft>
+                <a:spcPct val="0"/>
+              </a:spcAft>
+              <a:buClr>
+                <a:schemeClr val="accent5">
+                  <a:lumMod val="40000"/>
+                  <a:lumOff val="60000"/>
+                </a:schemeClr>
+              </a:buClr>
+              <a:buSzPct val="70000"/>
+              <a:buFont typeface="Wingdings 2" pitchFamily="18" charset="2"/>
+              <a:buNone/>
+            </a:pPr>
+            <a:r>
+              <a:rPr lang="en-US" b="1" dirty="0">
+                <a:solidFill>
+                  <a:srgbClr val="8CF4F2"/>
+                </a:solidFill>
+                <a:effectLst>
+                  <a:outerShdw blurRad="38100" dist="38100" dir="2700000" algn="tl">
+                    <a:srgbClr val="000000">
+                      <a:alpha val="43137"/>
+                    </a:srgbClr>
+                  </a:outerShdw>
+                </a:effectLst>
+                <a:latin typeface="Consolas" pitchFamily="49" charset="0"/>
+                <a:cs typeface="Consolas" pitchFamily="49" charset="0"/>
+              </a:rPr>
+              <a:t>	</a:t>
+            </a:r>
+            <a:r>
+              <a:rPr lang="en-US" b="1" dirty="0" smtClean="0">
+                <a:solidFill>
+                  <a:srgbClr val="8CF4F2"/>
+                </a:solidFill>
+                <a:effectLst>
+                  <a:outerShdw blurRad="38100" dist="38100" dir="2700000" algn="tl">
+                    <a:srgbClr val="000000">
+                      <a:alpha val="43137"/>
+                    </a:srgbClr>
+                  </a:outerShdw>
+                </a:effectLst>
+                <a:latin typeface="Consolas" pitchFamily="49" charset="0"/>
+                <a:cs typeface="Consolas" pitchFamily="49" charset="0"/>
+              </a:rPr>
+              <a:t>font-size:23px;</a:t>
+            </a:r>
+          </a:p>
+          <a:p>
+            <a:pPr fontAlgn="base">
+              <a:spcAft>
+                <a:spcPct val="0"/>
+              </a:spcAft>
+              <a:buClr>
+                <a:schemeClr val="accent5">
+                  <a:lumMod val="40000"/>
+                  <a:lumOff val="60000"/>
+                </a:schemeClr>
+              </a:buClr>
+              <a:buSzPct val="70000"/>
+              <a:buFont typeface="Wingdings 2" pitchFamily="18" charset="2"/>
+              <a:buNone/>
+            </a:pPr>
+            <a:r>
+              <a:rPr lang="en-US" b="1" dirty="0" smtClean="0">
+                <a:solidFill>
+                  <a:srgbClr val="8CF4F2"/>
+                </a:solidFill>
+                <a:effectLst>
+                  <a:outerShdw blurRad="38100" dist="38100" dir="2700000" algn="tl">
+                    <a:srgbClr val="000000">
+                      <a:alpha val="43137"/>
+                    </a:srgbClr>
+                  </a:outerShdw>
+                </a:effectLst>
+                <a:latin typeface="Consolas" pitchFamily="49" charset="0"/>
+                <a:cs typeface="Consolas" pitchFamily="49" charset="0"/>
+              </a:rPr>
+              <a:t>} </a:t>
+            </a:r>
+            <a:r>
+              <a:rPr lang="en-US" b="1" dirty="0">
+                <a:solidFill>
+                  <a:srgbClr val="8CF4F2"/>
+                </a:solidFill>
+                <a:effectLst>
+                  <a:outerShdw blurRad="38100" dist="38100" dir="2700000" algn="tl">
+                    <a:srgbClr val="000000">
+                      <a:alpha val="43137"/>
+                    </a:srgbClr>
+                  </a:outerShdw>
+                </a:effectLst>
+                <a:latin typeface="Consolas" pitchFamily="49" charset="0"/>
+                <a:cs typeface="Consolas" pitchFamily="49" charset="0"/>
+              </a:rPr>
+              <a:t>// 23 / 16 = 1.4375</a:t>
+            </a:r>
+          </a:p>
+          <a:p>
+            <a:pPr algn="ctr"/>
+            <a:endParaRPr lang="en-US" dirty="0"/>
+          </a:p>
+        </p:txBody>
+      </p:sp>
+      <p:sp>
+        <p:nvSpPr>
+          <p:cNvPr id="5" name="Rounded Rectangle 4"/>
+          <p:cNvSpPr/>
+          <p:nvPr/>
+        </p:nvSpPr>
+        <p:spPr>
+          <a:xfrm>
+            <a:off x="4560194" y="3040487"/>
+            <a:ext cx="3974206" cy="3124200"/>
+          </a:xfrm>
+          <a:prstGeom prst="roundRect">
+            <a:avLst/>
+          </a:prstGeom>
+        </p:spPr>
+        <p:style>
+          <a:lnRef idx="2">
+            <a:schemeClr val="accent1">
+              <a:shade val="50000"/>
+            </a:schemeClr>
+          </a:lnRef>
+          <a:fillRef idx="1">
+            <a:schemeClr val="accent1"/>
+          </a:fillRef>
+          <a:effectRef idx="0">
+            <a:schemeClr val="accent1"/>
+          </a:effectRef>
+          <a:fontRef idx="minor">
+            <a:schemeClr val="lt1"/>
+          </a:fontRef>
+        </p:style>
+        <p:txBody>
+          <a:bodyPr rtlCol="0" anchor="ctr"/>
+          <a:lstStyle/>
+          <a:p>
+            <a:pPr fontAlgn="base">
+              <a:spcAft>
+                <a:spcPct val="0"/>
+              </a:spcAft>
+              <a:buClr>
+                <a:schemeClr val="accent5">
+                  <a:lumMod val="40000"/>
+                  <a:lumOff val="60000"/>
+                </a:schemeClr>
+              </a:buClr>
+              <a:buSzPct val="70000"/>
+              <a:buFont typeface="Wingdings 2" pitchFamily="18" charset="2"/>
+              <a:buNone/>
+            </a:pPr>
+            <a:r>
+              <a:rPr lang="en-US" b="1" dirty="0">
+                <a:solidFill>
+                  <a:srgbClr val="8CF4F2"/>
+                </a:solidFill>
+                <a:effectLst>
+                  <a:outerShdw blurRad="38100" dist="38100" dir="2700000" algn="tl">
+                    <a:srgbClr val="000000">
+                      <a:alpha val="43137"/>
+                    </a:srgbClr>
+                  </a:outerShdw>
+                </a:effectLst>
+                <a:latin typeface="Consolas" pitchFamily="49" charset="0"/>
+                <a:cs typeface="Consolas" pitchFamily="49" charset="0"/>
+              </a:rPr>
+              <a:t>body{ </a:t>
+            </a:r>
+            <a:endParaRPr lang="en-US" b="1" dirty="0" smtClean="0">
+              <a:solidFill>
+                <a:srgbClr val="8CF4F2"/>
+              </a:solidFill>
+              <a:effectLst>
+                <a:outerShdw blurRad="38100" dist="38100" dir="2700000" algn="tl">
+                  <a:srgbClr val="000000">
+                    <a:alpha val="43137"/>
+                  </a:srgbClr>
+                </a:outerShdw>
+              </a:effectLst>
+              <a:latin typeface="Consolas" pitchFamily="49" charset="0"/>
+              <a:cs typeface="Consolas" pitchFamily="49" charset="0"/>
+            </a:endParaRPr>
+          </a:p>
+          <a:p>
+            <a:pPr fontAlgn="base">
+              <a:spcAft>
+                <a:spcPct val="0"/>
+              </a:spcAft>
+              <a:buClr>
+                <a:schemeClr val="accent5">
+                  <a:lumMod val="40000"/>
+                  <a:lumOff val="60000"/>
+                </a:schemeClr>
+              </a:buClr>
+              <a:buSzPct val="70000"/>
+              <a:buFont typeface="Wingdings 2" pitchFamily="18" charset="2"/>
+              <a:buNone/>
+            </a:pPr>
+            <a:r>
+              <a:rPr lang="en-US" b="1" dirty="0">
+                <a:solidFill>
+                  <a:srgbClr val="8CF4F2"/>
+                </a:solidFill>
+                <a:effectLst>
+                  <a:outerShdw blurRad="38100" dist="38100" dir="2700000" algn="tl">
+                    <a:srgbClr val="000000">
+                      <a:alpha val="43137"/>
+                    </a:srgbClr>
+                  </a:outerShdw>
+                </a:effectLst>
+                <a:latin typeface="Consolas" pitchFamily="49" charset="0"/>
+                <a:cs typeface="Consolas" pitchFamily="49" charset="0"/>
+              </a:rPr>
+              <a:t>	</a:t>
+            </a:r>
+            <a:r>
+              <a:rPr lang="en-US" b="1" dirty="0" smtClean="0">
+                <a:solidFill>
+                  <a:srgbClr val="8CF4F2"/>
+                </a:solidFill>
+                <a:effectLst>
+                  <a:outerShdw blurRad="38100" dist="38100" dir="2700000" algn="tl">
+                    <a:srgbClr val="000000">
+                      <a:alpha val="43137"/>
+                    </a:srgbClr>
+                  </a:outerShdw>
+                </a:effectLst>
+                <a:latin typeface="Consolas" pitchFamily="49" charset="0"/>
+                <a:cs typeface="Consolas" pitchFamily="49" charset="0"/>
+              </a:rPr>
+              <a:t>font-size:16px;</a:t>
+            </a:r>
+          </a:p>
+          <a:p>
+            <a:pPr fontAlgn="base">
+              <a:spcAft>
+                <a:spcPct val="0"/>
+              </a:spcAft>
+              <a:buClr>
+                <a:schemeClr val="accent5">
+                  <a:lumMod val="40000"/>
+                  <a:lumOff val="60000"/>
+                </a:schemeClr>
+              </a:buClr>
+              <a:buSzPct val="70000"/>
+              <a:buFont typeface="Wingdings 2" pitchFamily="18" charset="2"/>
+              <a:buNone/>
+            </a:pPr>
+            <a:r>
+              <a:rPr lang="en-US" b="1" dirty="0" smtClean="0">
+                <a:solidFill>
+                  <a:srgbClr val="8CF4F2"/>
+                </a:solidFill>
+                <a:effectLst>
+                  <a:outerShdw blurRad="38100" dist="38100" dir="2700000" algn="tl">
+                    <a:srgbClr val="000000">
+                      <a:alpha val="43137"/>
+                    </a:srgbClr>
+                  </a:outerShdw>
+                </a:effectLst>
+                <a:latin typeface="Consolas" pitchFamily="49" charset="0"/>
+                <a:cs typeface="Consolas" pitchFamily="49" charset="0"/>
+              </a:rPr>
+              <a:t>}  </a:t>
+            </a:r>
+            <a:endParaRPr lang="en-US" b="1" dirty="0">
+              <a:solidFill>
+                <a:srgbClr val="8CF4F2"/>
+              </a:solidFill>
+              <a:effectLst>
+                <a:outerShdw blurRad="38100" dist="38100" dir="2700000" algn="tl">
+                  <a:srgbClr val="000000">
+                    <a:alpha val="43137"/>
+                  </a:srgbClr>
+                </a:outerShdw>
+              </a:effectLst>
+              <a:latin typeface="Consolas" pitchFamily="49" charset="0"/>
+              <a:cs typeface="Consolas" pitchFamily="49" charset="0"/>
+            </a:endParaRPr>
+          </a:p>
+          <a:p>
+            <a:pPr fontAlgn="base">
+              <a:spcAft>
+                <a:spcPct val="0"/>
+              </a:spcAft>
+              <a:buClr>
+                <a:schemeClr val="accent5">
+                  <a:lumMod val="40000"/>
+                  <a:lumOff val="60000"/>
+                </a:schemeClr>
+              </a:buClr>
+              <a:buSzPct val="70000"/>
+              <a:buFont typeface="Wingdings 2" pitchFamily="18" charset="2"/>
+              <a:buNone/>
+            </a:pPr>
+            <a:r>
+              <a:rPr lang="en-US" b="1" dirty="0" smtClean="0">
+                <a:solidFill>
+                  <a:srgbClr val="8CF4F2"/>
+                </a:solidFill>
+                <a:effectLst>
+                  <a:outerShdw blurRad="38100" dist="38100" dir="2700000" algn="tl">
+                    <a:srgbClr val="000000">
+                      <a:alpha val="43137"/>
+                    </a:srgbClr>
+                  </a:outerShdw>
+                </a:effectLst>
+                <a:latin typeface="Consolas" pitchFamily="49" charset="0"/>
+                <a:cs typeface="Consolas" pitchFamily="49" charset="0"/>
+              </a:rPr>
+              <a:t>body </a:t>
+            </a:r>
+            <a:r>
+              <a:rPr lang="en-US" b="1" dirty="0">
+                <a:solidFill>
+                  <a:srgbClr val="8CF4F2"/>
+                </a:solidFill>
+                <a:effectLst>
+                  <a:outerShdw blurRad="38100" dist="38100" dir="2700000" algn="tl">
+                    <a:srgbClr val="000000">
+                      <a:alpha val="43137"/>
+                    </a:srgbClr>
+                  </a:outerShdw>
+                </a:effectLst>
+                <a:latin typeface="Consolas" pitchFamily="49" charset="0"/>
+                <a:cs typeface="Consolas" pitchFamily="49" charset="0"/>
+              </a:rPr>
+              <a:t>header{ </a:t>
+            </a:r>
+            <a:endParaRPr lang="en-US" b="1" dirty="0" smtClean="0">
+              <a:solidFill>
+                <a:srgbClr val="8CF4F2"/>
+              </a:solidFill>
+              <a:effectLst>
+                <a:outerShdw blurRad="38100" dist="38100" dir="2700000" algn="tl">
+                  <a:srgbClr val="000000">
+                    <a:alpha val="43137"/>
+                  </a:srgbClr>
+                </a:outerShdw>
+              </a:effectLst>
+              <a:latin typeface="Consolas" pitchFamily="49" charset="0"/>
+              <a:cs typeface="Consolas" pitchFamily="49" charset="0"/>
+            </a:endParaRPr>
+          </a:p>
+          <a:p>
+            <a:pPr fontAlgn="base">
+              <a:spcAft>
+                <a:spcPct val="0"/>
+              </a:spcAft>
+              <a:buClr>
+                <a:schemeClr val="accent5">
+                  <a:lumMod val="40000"/>
+                  <a:lumOff val="60000"/>
+                </a:schemeClr>
+              </a:buClr>
+              <a:buSzPct val="70000"/>
+              <a:buFont typeface="Wingdings 2" pitchFamily="18" charset="2"/>
+              <a:buNone/>
+            </a:pPr>
+            <a:r>
+              <a:rPr lang="en-US" b="1" dirty="0" smtClean="0">
+                <a:solidFill>
+                  <a:srgbClr val="8CF4F2"/>
+                </a:solidFill>
+                <a:effectLst>
+                  <a:outerShdw blurRad="38100" dist="38100" dir="2700000" algn="tl">
+                    <a:srgbClr val="000000">
+                      <a:alpha val="43137"/>
+                    </a:srgbClr>
+                  </a:outerShdw>
+                </a:effectLst>
+                <a:latin typeface="Consolas" pitchFamily="49" charset="0"/>
+                <a:cs typeface="Consolas" pitchFamily="49" charset="0"/>
+              </a:rPr>
+              <a:t>	font-size:1.4375em;</a:t>
+            </a:r>
+          </a:p>
+          <a:p>
+            <a:pPr fontAlgn="base">
+              <a:spcAft>
+                <a:spcPct val="0"/>
+              </a:spcAft>
+              <a:buClr>
+                <a:schemeClr val="accent5">
+                  <a:lumMod val="40000"/>
+                  <a:lumOff val="60000"/>
+                </a:schemeClr>
+              </a:buClr>
+              <a:buSzPct val="70000"/>
+              <a:buFont typeface="Wingdings 2" pitchFamily="18" charset="2"/>
+              <a:buNone/>
+            </a:pPr>
+            <a:r>
+              <a:rPr lang="en-US" b="1" dirty="0" smtClean="0">
+                <a:solidFill>
+                  <a:srgbClr val="8CF4F2"/>
+                </a:solidFill>
+                <a:effectLst>
+                  <a:outerShdw blurRad="38100" dist="38100" dir="2700000" algn="tl">
+                    <a:srgbClr val="000000">
+                      <a:alpha val="43137"/>
+                    </a:srgbClr>
+                  </a:outerShdw>
+                </a:effectLst>
+                <a:latin typeface="Consolas" pitchFamily="49" charset="0"/>
+                <a:cs typeface="Consolas" pitchFamily="49" charset="0"/>
+              </a:rPr>
+              <a:t>}</a:t>
+            </a:r>
+            <a:endParaRPr lang="en-US" b="1" dirty="0">
+              <a:solidFill>
+                <a:srgbClr val="8CF4F2"/>
+              </a:solidFill>
+              <a:effectLst>
+                <a:outerShdw blurRad="38100" dist="38100" dir="2700000" algn="tl">
+                  <a:srgbClr val="000000">
+                    <a:alpha val="43137"/>
+                  </a:srgbClr>
+                </a:outerShdw>
+              </a:effectLst>
+              <a:latin typeface="Consolas" pitchFamily="49" charset="0"/>
+              <a:cs typeface="Consolas" pitchFamily="49" charset="0"/>
+            </a:endParaRPr>
+          </a:p>
+        </p:txBody>
+      </p:sp>
+    </p:spTree>
+    <p:extLst>
+      <p:ext uri="{BB962C8B-B14F-4D97-AF65-F5344CB8AC3E}">
+        <p14:creationId xmlns:p14="http://schemas.microsoft.com/office/powerpoint/2010/main" val="569359527"/>
+      </p:ext>
+    </p:extLst>
+  </p:cSld>
+  <p:clrMapOvr>
+    <a:masterClrMapping/>
+  </p:clrMapOvr>
+  <p:timing>
+    <p:tnLst>
+      <p:par>
+        <p:cTn id="1" dur="indefinite" restart="never" nodeType="tmRoot"/>
+      </p:par>
+    </p:tnLst>
+  </p:timing>
+</p:sld>
+</file>
+
+<file path=ppt/slides/slide12.xml><?xml version="1.0" encoding="utf-8"?>
+<p:sld xmlns:a="http://schemas.openxmlformats.org/drawingml/2006/main" xmlns:r="http://schemas.openxmlformats.org/officeDocument/2006/relationships" xmlns:p="http://schemas.openxmlformats.org/presentationml/2006/main">
+  <p:cSld>
+    <p:spTree>
+      <p:nvGrpSpPr>
+        <p:cNvPr id="1" name=""/>
+        <p:cNvGrpSpPr/>
+        <p:nvPr/>
+      </p:nvGrpSpPr>
+      <p:grpSpPr>
+        <a:xfrm>
+          <a:off x="0" y="0"/>
+          <a:ext cx="0" cy="0"/>
+          <a:chOff x="0" y="0"/>
+          <a:chExt cx="0" cy="0"/>
+        </a:xfrm>
+      </p:grpSpPr>
+      <p:sp>
+        <p:nvSpPr>
+          <p:cNvPr id="2" name="Title 1"/>
+          <p:cNvSpPr>
+            <a:spLocks noGrp="1"/>
+          </p:cNvSpPr>
+          <p:nvPr>
+            <p:ph type="title"/>
+          </p:nvPr>
+        </p:nvSpPr>
+        <p:spPr>
+          <a:xfrm>
+            <a:off x="457200" y="685800"/>
+            <a:ext cx="8610600" cy="1143000"/>
+          </a:xfrm>
+        </p:spPr>
+        <p:txBody>
+          <a:bodyPr>
+            <a:normAutofit/>
+          </a:bodyPr>
+          <a:lstStyle/>
+          <a:p>
+            <a:pPr algn="l"/>
+            <a:r>
+              <a:rPr lang="en-US" dirty="0" smtClean="0">
+                <a:solidFill>
+                  <a:schemeClr val="accent6"/>
+                </a:solidFill>
+              </a:rPr>
+              <a:t>CSS Media Queries</a:t>
+            </a:r>
+            <a:endParaRPr lang="bg-BG" dirty="0">
+              <a:solidFill>
+                <a:schemeClr val="accent6"/>
+              </a:solidFill>
+            </a:endParaRPr>
+          </a:p>
+        </p:txBody>
+      </p:sp>
+      <p:sp>
+        <p:nvSpPr>
+          <p:cNvPr id="6" name="Content Placeholder 5"/>
+          <p:cNvSpPr>
+            <a:spLocks noGrp="1"/>
+          </p:cNvSpPr>
+          <p:nvPr>
+            <p:ph idx="1"/>
+          </p:nvPr>
+        </p:nvSpPr>
+        <p:spPr>
+          <a:xfrm>
+            <a:off x="457200" y="1600200"/>
+            <a:ext cx="8229600" cy="4876799"/>
+          </a:xfrm>
+        </p:spPr>
+        <p:txBody>
+          <a:bodyPr>
+            <a:normAutofit/>
+          </a:bodyPr>
+          <a:lstStyle/>
+          <a:p>
+            <a:pPr marL="0" indent="0">
+              <a:buNone/>
+            </a:pPr>
+            <a:r>
+              <a:rPr lang="en-US" dirty="0" smtClean="0">
+                <a:solidFill>
+                  <a:schemeClr val="bg1"/>
+                </a:solidFill>
+              </a:rPr>
+              <a:t>Media Queries </a:t>
+            </a:r>
+            <a:r>
+              <a:rPr lang="bg-BG" dirty="0" smtClean="0">
+                <a:solidFill>
+                  <a:schemeClr val="bg1"/>
+                </a:solidFill>
+              </a:rPr>
+              <a:t>най-общо са начин, по който може да се стилизира страница в определена резолюция, като с </a:t>
+            </a:r>
+            <a:r>
+              <a:rPr lang="en-US" dirty="0" smtClean="0">
+                <a:solidFill>
+                  <a:schemeClr val="bg1"/>
+                </a:solidFill>
+              </a:rPr>
+              <a:t>N </a:t>
+            </a:r>
+            <a:r>
+              <a:rPr lang="bg-BG" dirty="0" smtClean="0">
+                <a:solidFill>
+                  <a:schemeClr val="bg1"/>
+                </a:solidFill>
+              </a:rPr>
+              <a:t>на брой </a:t>
+            </a:r>
+            <a:r>
+              <a:rPr lang="en-US" dirty="0" smtClean="0">
+                <a:solidFill>
+                  <a:schemeClr val="bg1"/>
+                </a:solidFill>
+              </a:rPr>
+              <a:t>media queries </a:t>
+            </a:r>
+            <a:r>
+              <a:rPr lang="bg-BG" dirty="0" smtClean="0">
+                <a:solidFill>
+                  <a:schemeClr val="bg1"/>
+                </a:solidFill>
+              </a:rPr>
+              <a:t>могат да се стилизират </a:t>
+            </a:r>
+            <a:r>
+              <a:rPr lang="en-US" dirty="0" smtClean="0">
+                <a:solidFill>
+                  <a:schemeClr val="bg1"/>
+                </a:solidFill>
+              </a:rPr>
+              <a:t>N </a:t>
+            </a:r>
+            <a:r>
+              <a:rPr lang="bg-BG" dirty="0" smtClean="0">
+                <a:solidFill>
+                  <a:schemeClr val="bg1"/>
+                </a:solidFill>
+              </a:rPr>
+              <a:t>на брой устройства. Абстрактно определяни като „филтри“.</a:t>
+            </a:r>
+            <a:endParaRPr lang="en-US" dirty="0">
+              <a:solidFill>
+                <a:schemeClr val="bg1"/>
+              </a:solidFill>
+            </a:endParaRPr>
+          </a:p>
+        </p:txBody>
+      </p:sp>
+    </p:spTree>
+    <p:extLst>
+      <p:ext uri="{BB962C8B-B14F-4D97-AF65-F5344CB8AC3E}">
+        <p14:creationId xmlns:p14="http://schemas.microsoft.com/office/powerpoint/2010/main" val="2202466883"/>
+      </p:ext>
+    </p:extLst>
+  </p:cSld>
+  <p:clrMapOvr>
+    <a:masterClrMapping/>
+  </p:clrMapOvr>
+  <p:timing>
+    <p:tnLst>
+      <p:par>
+        <p:cTn id="1" dur="indefinite" restart="never" nodeType="tmRoot"/>
+      </p:par>
+    </p:tnLst>
+  </p:timing>
+</p:sld>
+</file>
+
+<file path=ppt/slides/slide13.xml><?xml version="1.0" encoding="utf-8"?>
+<p:sld xmlns:a="http://schemas.openxmlformats.org/drawingml/2006/main" xmlns:r="http://schemas.openxmlformats.org/officeDocument/2006/relationships" xmlns:p="http://schemas.openxmlformats.org/presentationml/2006/main">
+  <p:cSld>
+    <p:spTree>
+      <p:nvGrpSpPr>
+        <p:cNvPr id="1" name=""/>
+        <p:cNvGrpSpPr/>
+        <p:nvPr/>
+      </p:nvGrpSpPr>
+      <p:grpSpPr>
+        <a:xfrm>
+          <a:off x="0" y="0"/>
+          <a:ext cx="0" cy="0"/>
+          <a:chOff x="0" y="0"/>
+          <a:chExt cx="0" cy="0"/>
+        </a:xfrm>
+      </p:grpSpPr>
+      <p:sp>
+        <p:nvSpPr>
+          <p:cNvPr id="2" name="Title 1"/>
+          <p:cNvSpPr>
+            <a:spLocks noGrp="1"/>
+          </p:cNvSpPr>
+          <p:nvPr>
+            <p:ph type="title"/>
+          </p:nvPr>
+        </p:nvSpPr>
+        <p:spPr>
+          <a:xfrm>
+            <a:off x="457200" y="685800"/>
+            <a:ext cx="8610600" cy="1143000"/>
+          </a:xfrm>
+        </p:spPr>
+        <p:txBody>
+          <a:bodyPr>
+            <a:normAutofit/>
+          </a:bodyPr>
+          <a:lstStyle/>
+          <a:p>
+            <a:pPr algn="l"/>
+            <a:r>
+              <a:rPr lang="en-US" dirty="0" smtClean="0">
+                <a:solidFill>
+                  <a:schemeClr val="accent6"/>
+                </a:solidFill>
+              </a:rPr>
+              <a:t>CSS Media Queries</a:t>
+            </a:r>
+            <a:r>
+              <a:rPr lang="bg-BG" dirty="0" smtClean="0">
+                <a:solidFill>
+                  <a:schemeClr val="accent6"/>
+                </a:solidFill>
+              </a:rPr>
+              <a:t> - пример</a:t>
+            </a:r>
+            <a:endParaRPr lang="bg-BG" dirty="0">
+              <a:solidFill>
+                <a:schemeClr val="accent6"/>
+              </a:solidFill>
+            </a:endParaRPr>
+          </a:p>
+        </p:txBody>
+      </p:sp>
+      <p:sp>
+        <p:nvSpPr>
+          <p:cNvPr id="6" name="Content Placeholder 5"/>
+          <p:cNvSpPr>
+            <a:spLocks noGrp="1"/>
+          </p:cNvSpPr>
+          <p:nvPr>
+            <p:ph idx="1"/>
+          </p:nvPr>
+        </p:nvSpPr>
+        <p:spPr>
+          <a:xfrm>
+            <a:off x="457200" y="1600200"/>
+            <a:ext cx="8229600" cy="4876799"/>
+          </a:xfrm>
+        </p:spPr>
+        <p:txBody>
+          <a:bodyPr>
+            <a:normAutofit/>
+          </a:bodyPr>
+          <a:lstStyle/>
+          <a:p>
+            <a:pPr marL="0" indent="0">
+              <a:buNone/>
+            </a:pPr>
+            <a:endParaRPr lang="en-US" sz="2400" dirty="0" smtClean="0">
+              <a:solidFill>
+                <a:schemeClr val="bg1"/>
+              </a:solidFill>
+              <a:latin typeface="Courier New" panose="02070309020205020404" pitchFamily="49" charset="0"/>
+              <a:cs typeface="Courier New" panose="02070309020205020404" pitchFamily="49" charset="0"/>
+            </a:endParaRPr>
+          </a:p>
+          <a:p>
+            <a:pPr marL="0" indent="0">
+              <a:buNone/>
+            </a:pPr>
+            <a:endParaRPr lang="en-US" sz="2400" dirty="0">
+              <a:solidFill>
+                <a:schemeClr val="bg1"/>
+              </a:solidFill>
+              <a:latin typeface="Courier New" panose="02070309020205020404" pitchFamily="49" charset="0"/>
+              <a:cs typeface="Courier New" panose="02070309020205020404" pitchFamily="49" charset="0"/>
+            </a:endParaRPr>
+          </a:p>
+          <a:p>
+            <a:pPr marL="0" indent="0">
+              <a:buNone/>
+            </a:pPr>
+            <a:endParaRPr lang="en-US" sz="2400" dirty="0" smtClean="0">
+              <a:solidFill>
+                <a:schemeClr val="bg1"/>
+              </a:solidFill>
+              <a:latin typeface="Courier New" panose="02070309020205020404" pitchFamily="49" charset="0"/>
+              <a:cs typeface="Courier New" panose="02070309020205020404" pitchFamily="49" charset="0"/>
+            </a:endParaRPr>
+          </a:p>
+          <a:p>
+            <a:pPr marL="0" indent="0">
+              <a:buNone/>
+            </a:pPr>
+            <a:r>
+              <a:rPr lang="en-US" sz="2400" dirty="0" smtClean="0">
+                <a:solidFill>
+                  <a:schemeClr val="bg1"/>
+                </a:solidFill>
+                <a:latin typeface="Courier New" panose="02070309020205020404" pitchFamily="49" charset="0"/>
+                <a:cs typeface="Courier New" panose="02070309020205020404" pitchFamily="49" charset="0"/>
+              </a:rPr>
+              <a:t>@</a:t>
+            </a:r>
+            <a:r>
+              <a:rPr lang="en-US" sz="2400" dirty="0">
+                <a:solidFill>
+                  <a:schemeClr val="bg1"/>
+                </a:solidFill>
+                <a:latin typeface="Courier New" panose="02070309020205020404" pitchFamily="49" charset="0"/>
+                <a:cs typeface="Courier New" panose="02070309020205020404" pitchFamily="49" charset="0"/>
+              </a:rPr>
+              <a:t>media only screen and (max-width: 960px) { </a:t>
+            </a:r>
+          </a:p>
+          <a:p>
+            <a:pPr marL="0" indent="0">
+              <a:buNone/>
+            </a:pPr>
+            <a:r>
+              <a:rPr lang="en-US" sz="2400" dirty="0">
+                <a:solidFill>
+                  <a:schemeClr val="bg1"/>
+                </a:solidFill>
+                <a:latin typeface="Courier New" panose="02070309020205020404" pitchFamily="49" charset="0"/>
+                <a:cs typeface="Courier New" panose="02070309020205020404" pitchFamily="49" charset="0"/>
+              </a:rPr>
+              <a:t>  .box {width: 310px; height: 310px;}</a:t>
+            </a:r>
+          </a:p>
+          <a:p>
+            <a:pPr marL="0" indent="0">
+              <a:buNone/>
+            </a:pPr>
+            <a:r>
+              <a:rPr lang="en-US" sz="2400" dirty="0" smtClean="0">
+                <a:solidFill>
+                  <a:schemeClr val="bg1"/>
+                </a:solidFill>
+                <a:latin typeface="Courier New" panose="02070309020205020404" pitchFamily="49" charset="0"/>
+                <a:cs typeface="Courier New" panose="02070309020205020404" pitchFamily="49" charset="0"/>
+              </a:rPr>
+              <a:t>}</a:t>
+            </a:r>
+          </a:p>
+          <a:p>
+            <a:pPr marL="0" indent="0">
+              <a:buNone/>
+            </a:pPr>
+            <a:endParaRPr lang="en-US" sz="2400" dirty="0">
+              <a:solidFill>
+                <a:schemeClr val="bg1"/>
+              </a:solidFill>
+              <a:latin typeface="Courier New" panose="02070309020205020404" pitchFamily="49" charset="0"/>
+              <a:cs typeface="Courier New" panose="02070309020205020404" pitchFamily="49" charset="0"/>
+            </a:endParaRPr>
+          </a:p>
+          <a:p>
+            <a:pPr marL="0" indent="0">
+              <a:buNone/>
+            </a:pPr>
+            <a:endParaRPr lang="en-US" sz="2400" dirty="0" smtClean="0">
+              <a:solidFill>
+                <a:schemeClr val="bg1"/>
+              </a:solidFill>
+              <a:latin typeface="Courier New" panose="02070309020205020404" pitchFamily="49" charset="0"/>
+              <a:cs typeface="Courier New" panose="02070309020205020404" pitchFamily="49" charset="0"/>
+            </a:endParaRPr>
+          </a:p>
+          <a:p>
+            <a:pPr marL="0" indent="0">
+              <a:buNone/>
+            </a:pPr>
+            <a:r>
+              <a:rPr lang="en-US" sz="2400" dirty="0" smtClean="0">
+                <a:solidFill>
+                  <a:schemeClr val="bg1"/>
+                </a:solidFill>
+                <a:latin typeface="Courier New" panose="02070309020205020404" pitchFamily="49" charset="0"/>
+                <a:cs typeface="Courier New" panose="02070309020205020404" pitchFamily="49" charset="0"/>
+              </a:rPr>
+              <a:t>Media type – screen/print/all</a:t>
+            </a:r>
+            <a:endParaRPr lang="en-US" sz="2400" dirty="0">
+              <a:solidFill>
+                <a:schemeClr val="bg1"/>
+              </a:solidFill>
+              <a:latin typeface="Courier New" panose="02070309020205020404" pitchFamily="49" charset="0"/>
+              <a:cs typeface="Courier New" panose="02070309020205020404" pitchFamily="49" charset="0"/>
+            </a:endParaRPr>
+          </a:p>
+          <a:p>
+            <a:pPr marL="0" indent="0">
+              <a:buNone/>
+            </a:pPr>
+            <a:endParaRPr lang="en-US" sz="1500" dirty="0">
+              <a:solidFill>
+                <a:schemeClr val="bg1"/>
+              </a:solidFill>
+              <a:latin typeface="Courier New" panose="02070309020205020404" pitchFamily="49" charset="0"/>
+              <a:cs typeface="Courier New" panose="02070309020205020404" pitchFamily="49" charset="0"/>
+            </a:endParaRPr>
+          </a:p>
+        </p:txBody>
+      </p:sp>
+    </p:spTree>
+    <p:extLst>
+      <p:ext uri="{BB962C8B-B14F-4D97-AF65-F5344CB8AC3E}">
+        <p14:creationId xmlns:p14="http://schemas.microsoft.com/office/powerpoint/2010/main" val="2981051020"/>
+      </p:ext>
+    </p:extLst>
+  </p:cSld>
+  <p:clrMapOvr>
+    <a:masterClrMapping/>
+  </p:clrMapOvr>
+  <p:timing>
+    <p:tnLst>
+      <p:par>
+        <p:cTn id="1" dur="indefinite" restart="never" nodeType="tmRoot"/>
+      </p:par>
+    </p:tnLst>
+  </p:timing>
+</p:sld>
+</file>
+
+<file path=ppt/slides/slide14.xml><?xml version="1.0" encoding="utf-8"?>
+<p:sld xmlns:a="http://schemas.openxmlformats.org/drawingml/2006/main" xmlns:r="http://schemas.openxmlformats.org/officeDocument/2006/relationships" xmlns:p="http://schemas.openxmlformats.org/presentationml/2006/main">
+  <p:cSld>
+    <p:spTree>
+      <p:nvGrpSpPr>
+        <p:cNvPr id="1" name=""/>
+        <p:cNvGrpSpPr/>
+        <p:nvPr/>
+      </p:nvGrpSpPr>
+      <p:grpSpPr>
+        <a:xfrm>
+          <a:off x="0" y="0"/>
+          <a:ext cx="0" cy="0"/>
+          <a:chOff x="0" y="0"/>
+          <a:chExt cx="0" cy="0"/>
+        </a:xfrm>
+      </p:grpSpPr>
+      <p:sp>
+        <p:nvSpPr>
+          <p:cNvPr id="2" name="Title 1"/>
+          <p:cNvSpPr>
+            <a:spLocks noGrp="1"/>
+          </p:cNvSpPr>
+          <p:nvPr>
+            <p:ph type="title"/>
+          </p:nvPr>
+        </p:nvSpPr>
+        <p:spPr>
+          <a:xfrm>
+            <a:off x="457200" y="685800"/>
+            <a:ext cx="8610600" cy="1143000"/>
+          </a:xfrm>
+        </p:spPr>
+        <p:txBody>
+          <a:bodyPr>
+            <a:normAutofit/>
+          </a:bodyPr>
+          <a:lstStyle/>
+          <a:p>
+            <a:pPr algn="l"/>
+            <a:r>
+              <a:rPr lang="en-US" dirty="0" smtClean="0">
+                <a:solidFill>
+                  <a:schemeClr val="accent6"/>
+                </a:solidFill>
+              </a:rPr>
+              <a:t>CSS Media Queries</a:t>
+            </a:r>
+            <a:r>
+              <a:rPr lang="bg-BG" dirty="0" smtClean="0">
+                <a:solidFill>
+                  <a:schemeClr val="accent6"/>
+                </a:solidFill>
+              </a:rPr>
+              <a:t> - свойства</a:t>
+            </a:r>
+            <a:endParaRPr lang="bg-BG" dirty="0">
+              <a:solidFill>
+                <a:schemeClr val="accent6"/>
+              </a:solidFill>
+            </a:endParaRPr>
+          </a:p>
+        </p:txBody>
+      </p:sp>
+      <p:sp>
+        <p:nvSpPr>
+          <p:cNvPr id="6" name="Content Placeholder 5"/>
+          <p:cNvSpPr>
+            <a:spLocks noGrp="1"/>
+          </p:cNvSpPr>
+          <p:nvPr>
+            <p:ph idx="1"/>
+          </p:nvPr>
+        </p:nvSpPr>
+        <p:spPr>
+          <a:xfrm>
+            <a:off x="457200" y="1600200"/>
+            <a:ext cx="8229600" cy="4876799"/>
+          </a:xfrm>
+        </p:spPr>
+        <p:txBody>
+          <a:bodyPr>
+            <a:normAutofit fontScale="77500" lnSpcReduction="20000"/>
+          </a:bodyPr>
+          <a:lstStyle/>
+          <a:p>
+            <a:r>
+              <a:rPr lang="en-US" dirty="0" smtClean="0">
+                <a:solidFill>
+                  <a:schemeClr val="bg1"/>
+                </a:solidFill>
+              </a:rPr>
+              <a:t>min-width</a:t>
+            </a:r>
+            <a:r>
+              <a:rPr lang="bg-BG" dirty="0" smtClean="0">
+                <a:solidFill>
+                  <a:schemeClr val="bg1"/>
+                </a:solidFill>
+              </a:rPr>
+              <a:t> - свойство, с което се стилизират страници в устройства с широчина, по-голяма от определена</a:t>
+            </a:r>
+            <a:endParaRPr lang="en-US" dirty="0">
+              <a:solidFill>
+                <a:schemeClr val="bg1"/>
+              </a:solidFill>
+            </a:endParaRPr>
+          </a:p>
+          <a:p>
+            <a:r>
+              <a:rPr lang="en-US" dirty="0" smtClean="0">
+                <a:solidFill>
+                  <a:schemeClr val="bg1"/>
+                </a:solidFill>
+              </a:rPr>
+              <a:t>max-width</a:t>
+            </a:r>
+            <a:r>
+              <a:rPr lang="bg-BG" dirty="0">
+                <a:solidFill>
+                  <a:schemeClr val="bg1"/>
+                </a:solidFill>
+              </a:rPr>
+              <a:t> </a:t>
+            </a:r>
+            <a:r>
+              <a:rPr lang="bg-BG" dirty="0" smtClean="0">
+                <a:solidFill>
+                  <a:schemeClr val="bg1"/>
+                </a:solidFill>
+              </a:rPr>
+              <a:t>- </a:t>
+            </a:r>
+            <a:r>
+              <a:rPr lang="bg-BG" dirty="0">
+                <a:solidFill>
+                  <a:schemeClr val="bg1"/>
+                </a:solidFill>
+              </a:rPr>
+              <a:t>свойство, с което се стилизират </a:t>
+            </a:r>
+            <a:r>
+              <a:rPr lang="bg-BG" dirty="0" smtClean="0">
+                <a:solidFill>
+                  <a:schemeClr val="bg1"/>
+                </a:solidFill>
+              </a:rPr>
+              <a:t>страници </a:t>
+            </a:r>
+            <a:r>
+              <a:rPr lang="bg-BG" dirty="0">
+                <a:solidFill>
+                  <a:schemeClr val="bg1"/>
+                </a:solidFill>
+              </a:rPr>
+              <a:t>в устройства </a:t>
+            </a:r>
+            <a:r>
+              <a:rPr lang="bg-BG" dirty="0" smtClean="0">
+                <a:solidFill>
+                  <a:schemeClr val="bg1"/>
+                </a:solidFill>
+              </a:rPr>
+              <a:t>с широчина, по-малка от определена</a:t>
+            </a:r>
+          </a:p>
+          <a:p>
+            <a:r>
+              <a:rPr lang="en-US" dirty="0" smtClean="0">
+                <a:solidFill>
+                  <a:schemeClr val="bg1"/>
+                </a:solidFill>
+              </a:rPr>
+              <a:t>min-height</a:t>
+            </a:r>
+            <a:r>
+              <a:rPr lang="bg-BG" dirty="0" smtClean="0">
+                <a:solidFill>
+                  <a:schemeClr val="bg1"/>
+                </a:solidFill>
+              </a:rPr>
+              <a:t> - </a:t>
+            </a:r>
+            <a:r>
+              <a:rPr lang="bg-BG" dirty="0">
+                <a:solidFill>
+                  <a:schemeClr val="bg1"/>
+                </a:solidFill>
+              </a:rPr>
+              <a:t>свойство, с което се стилизират страници в устройства </a:t>
+            </a:r>
+            <a:r>
+              <a:rPr lang="bg-BG" dirty="0" smtClean="0">
+                <a:solidFill>
+                  <a:schemeClr val="bg1"/>
+                </a:solidFill>
+              </a:rPr>
+              <a:t>с височина, по-голяма </a:t>
+            </a:r>
+            <a:r>
+              <a:rPr lang="bg-BG" dirty="0">
+                <a:solidFill>
+                  <a:schemeClr val="bg1"/>
+                </a:solidFill>
+              </a:rPr>
+              <a:t>от определена </a:t>
+            </a:r>
+            <a:endParaRPr lang="bg-BG" dirty="0" smtClean="0">
+              <a:solidFill>
+                <a:schemeClr val="bg1"/>
+              </a:solidFill>
+            </a:endParaRPr>
+          </a:p>
+          <a:p>
+            <a:r>
+              <a:rPr lang="en-US" dirty="0" smtClean="0">
+                <a:solidFill>
+                  <a:schemeClr val="bg1"/>
+                </a:solidFill>
+              </a:rPr>
+              <a:t>max-height</a:t>
+            </a:r>
+            <a:r>
+              <a:rPr lang="bg-BG" dirty="0" smtClean="0">
+                <a:solidFill>
+                  <a:schemeClr val="bg1"/>
+                </a:solidFill>
+              </a:rPr>
+              <a:t> - </a:t>
+            </a:r>
+            <a:r>
+              <a:rPr lang="bg-BG" dirty="0">
+                <a:solidFill>
+                  <a:schemeClr val="bg1"/>
+                </a:solidFill>
+              </a:rPr>
+              <a:t>свойство, с което се стилизират страници в устройства </a:t>
+            </a:r>
+            <a:r>
+              <a:rPr lang="bg-BG" dirty="0" smtClean="0">
+                <a:solidFill>
+                  <a:schemeClr val="bg1"/>
+                </a:solidFill>
+              </a:rPr>
+              <a:t>с височина, </a:t>
+            </a:r>
+            <a:r>
+              <a:rPr lang="bg-BG" dirty="0">
+                <a:solidFill>
+                  <a:schemeClr val="bg1"/>
+                </a:solidFill>
+              </a:rPr>
+              <a:t>по-малка от определена </a:t>
+            </a:r>
+            <a:r>
+              <a:rPr lang="en-US" dirty="0" smtClean="0">
+                <a:solidFill>
+                  <a:schemeClr val="bg1"/>
+                </a:solidFill>
+              </a:rPr>
+              <a:t>orientation=portrait</a:t>
+            </a:r>
+            <a:r>
+              <a:rPr lang="bg-BG" dirty="0" smtClean="0">
+                <a:solidFill>
+                  <a:schemeClr val="bg1"/>
+                </a:solidFill>
+              </a:rPr>
+              <a:t> - </a:t>
+            </a:r>
+            <a:r>
+              <a:rPr lang="bg-BG" dirty="0">
+                <a:solidFill>
+                  <a:schemeClr val="bg1"/>
+                </a:solidFill>
+              </a:rPr>
+              <a:t>свойство, с което се стилизират страници в устройства </a:t>
+            </a:r>
+            <a:r>
+              <a:rPr lang="bg-BG" dirty="0" smtClean="0">
+                <a:solidFill>
+                  <a:schemeClr val="bg1"/>
+                </a:solidFill>
+              </a:rPr>
+              <a:t>с ориентация портрет</a:t>
+            </a:r>
+          </a:p>
+          <a:p>
+            <a:r>
+              <a:rPr lang="en-US" dirty="0" smtClean="0">
+                <a:solidFill>
+                  <a:schemeClr val="bg1"/>
+                </a:solidFill>
+              </a:rPr>
+              <a:t>orientation=landscape - </a:t>
+            </a:r>
+            <a:r>
+              <a:rPr lang="bg-BG" dirty="0" smtClean="0">
+                <a:solidFill>
+                  <a:schemeClr val="bg1"/>
+                </a:solidFill>
+              </a:rPr>
+              <a:t>свойство</a:t>
+            </a:r>
+            <a:r>
+              <a:rPr lang="bg-BG" dirty="0">
+                <a:solidFill>
+                  <a:schemeClr val="bg1"/>
+                </a:solidFill>
+              </a:rPr>
+              <a:t>, с което се стилизират страници в устройства с ориентация </a:t>
+            </a:r>
+            <a:r>
+              <a:rPr lang="bg-BG" dirty="0" smtClean="0">
+                <a:solidFill>
+                  <a:schemeClr val="bg1"/>
+                </a:solidFill>
+              </a:rPr>
+              <a:t>пейзаж</a:t>
+            </a:r>
+            <a:endParaRPr lang="en-US" dirty="0">
+              <a:solidFill>
+                <a:schemeClr val="bg1"/>
+              </a:solidFill>
+            </a:endParaRPr>
+          </a:p>
+        </p:txBody>
+      </p:sp>
+    </p:spTree>
+    <p:extLst>
+      <p:ext uri="{BB962C8B-B14F-4D97-AF65-F5344CB8AC3E}">
+        <p14:creationId xmlns:p14="http://schemas.microsoft.com/office/powerpoint/2010/main" val="3239949839"/>
+      </p:ext>
+    </p:extLst>
+  </p:cSld>
+  <p:clrMapOvr>
+    <a:masterClrMapping/>
+  </p:clrMapOvr>
+  <p:timing>
+    <p:tnLst>
+      <p:par>
+        <p:cTn id="1" dur="indefinite" restart="never" nodeType="tmRoot"/>
+      </p:par>
+    </p:tnLst>
+  </p:timing>
+</p:sld>
+</file>
+
+<file path=ppt/slides/slide15.xml><?xml version="1.0" encoding="utf-8"?>
+<p:sld xmlns:a="http://schemas.openxmlformats.org/drawingml/2006/main" xmlns:r="http://schemas.openxmlformats.org/officeDocument/2006/relationships" xmlns:p="http://schemas.openxmlformats.org/presentationml/2006/main">
+  <p:cSld>
+    <p:spTree>
+      <p:nvGrpSpPr>
+        <p:cNvPr id="1" name=""/>
+        <p:cNvGrpSpPr/>
+        <p:nvPr/>
+      </p:nvGrpSpPr>
+      <p:grpSpPr>
+        <a:xfrm>
+          <a:off x="0" y="0"/>
+          <a:ext cx="0" cy="0"/>
+          <a:chOff x="0" y="0"/>
+          <a:chExt cx="0" cy="0"/>
+        </a:xfrm>
+      </p:grpSpPr>
+      <p:sp>
+        <p:nvSpPr>
+          <p:cNvPr id="2" name="Title 1"/>
+          <p:cNvSpPr>
+            <a:spLocks noGrp="1"/>
+          </p:cNvSpPr>
+          <p:nvPr>
+            <p:ph type="title"/>
+          </p:nvPr>
+        </p:nvSpPr>
+        <p:spPr>
+          <a:xfrm>
+            <a:off x="457200" y="685800"/>
+            <a:ext cx="8610600" cy="1143000"/>
+          </a:xfrm>
+        </p:spPr>
+        <p:txBody>
+          <a:bodyPr>
             <a:noAutofit/>
           </a:bodyPr>
           <a:lstStyle/>
@@ -3651,7 +5535,7 @@
 </p:sld>
 </file>
 
-<file path=ppt/slides/slide11.xml><?xml version="1.0" encoding="utf-8"?>
+<file path=ppt/slides/slide16.xml><?xml version="1.0" encoding="utf-8"?>
 <p:sld xmlns:a="http://schemas.openxmlformats.org/drawingml/2006/main" xmlns:r="http://schemas.openxmlformats.org/officeDocument/2006/relationships" xmlns:p="http://schemas.openxmlformats.org/presentationml/2006/main">
   <p:cSld>
     <p:spTree>
@@ -3680,12 +5564,14 @@
         </p:nvSpPr>
         <p:spPr>
           <a:xfrm>
-            <a:off x="838200" y="685800"/>
+            <a:off x="457200" y="2723882"/>
             <a:ext cx="8229600" cy="1143000"/>
           </a:xfrm>
         </p:spPr>
         <p:txBody>
-          <a:bodyPr/>
+          <a:bodyPr>
+            <a:normAutofit fontScale="90000"/>
+          </a:bodyPr>
           <a:lstStyle/>
           <a:p>
             <a:pPr algn="l"/>
@@ -3696,6 +5582,59 @@
                 </a:solidFill>
               </a:rPr>
               <a:t>Въпроси</a:t>
+            </a:r>
+            <a:r>
+              <a:rPr lang="en-US" dirty="0">
+                <a:solidFill>
+                  <a:schemeClr val="accent6"/>
+                </a:solidFill>
+              </a:rPr>
+              <a:t/>
+            </a:r>
+            <a:br>
+              <a:rPr lang="en-US" dirty="0">
+                <a:solidFill>
+                  <a:schemeClr val="accent6"/>
+                </a:solidFill>
+              </a:rPr>
+            </a:br>
+            <a:r>
+              <a:rPr lang="en-US" dirty="0">
+                <a:solidFill>
+                  <a:schemeClr val="accent6"/>
+                </a:solidFill>
+              </a:rPr>
+              <a:t/>
+            </a:r>
+            <a:br>
+              <a:rPr lang="en-US" dirty="0">
+                <a:solidFill>
+                  <a:schemeClr val="accent6"/>
+                </a:solidFill>
+              </a:rPr>
+            </a:br>
+            <a:r>
+              <a:rPr lang="en-US" dirty="0">
+                <a:solidFill>
+                  <a:schemeClr val="accent6"/>
+                </a:solidFill>
+              </a:rPr>
+              <a:t/>
+            </a:r>
+            <a:br>
+              <a:rPr lang="en-US" dirty="0">
+                <a:solidFill>
+                  <a:schemeClr val="accent6"/>
+                </a:solidFill>
+              </a:rPr>
+            </a:br>
+            <a:r>
+              <a:rPr lang="en-US" dirty="0">
+                <a:solidFill>
+                  <a:schemeClr val="accent6"/>
+                </a:solidFill>
+              </a:rPr>
+              <a:t>http://desarrolloweb.dlsi.ua.es/cursos/2012/web-accessibility/responsive-design-exercises</a:t>
             </a:r>
             <a:endParaRPr lang="bg-BG" dirty="0">
               <a:solidFill>
@@ -3803,7 +5742,7 @@
         </p:blipFill>
         <p:spPr bwMode="auto">
           <a:xfrm>
-            <a:off x="3505200" y="2057400"/>
+            <a:off x="5387126" y="304800"/>
             <a:ext cx="2419082" cy="2419082"/>
           </a:xfrm>
           <a:prstGeom prst="rect">
@@ -3841,7 +5780,7 @@
 </p:sld>
 </file>
 
-<file path=ppt/slides/slide12.xml><?xml version="1.0" encoding="utf-8"?>
+<file path=ppt/slides/slide17.xml><?xml version="1.0" encoding="utf-8"?>
 <p:sld xmlns:a="http://schemas.openxmlformats.org/drawingml/2006/main" xmlns:r="http://schemas.openxmlformats.org/officeDocument/2006/relationships" xmlns:p="http://schemas.openxmlformats.org/presentationml/2006/main">
   <p:cSld>
     <p:spTree>
@@ -4014,51 +5953,6 @@
                 </a:solidFill>
               </a:rPr>
               <a:t>.</a:t>
-            </a:r>
-          </a:p>
-          <a:p>
-            <a:pPr marL="457200" indent="-457200">
-              <a:buAutoNum type="arabicPeriod"/>
-            </a:pPr>
-            <a:r>
-              <a:rPr lang="bg-BG" sz="2000" b="1" dirty="0" smtClean="0">
-                <a:solidFill>
-                  <a:schemeClr val="bg1">
-                    <a:lumMod val="95000"/>
-                  </a:schemeClr>
-                </a:solidFill>
-              </a:rPr>
-              <a:t>Бонус задача – за устройства с ширина по-малка от 480</a:t>
-            </a:r>
-            <a:r>
-              <a:rPr lang="en-US" sz="2000" b="1" dirty="0" err="1" smtClean="0">
-                <a:solidFill>
-                  <a:schemeClr val="bg1">
-                    <a:lumMod val="95000"/>
-                  </a:schemeClr>
-                </a:solidFill>
-              </a:rPr>
-              <a:t>px</a:t>
-            </a:r>
-            <a:r>
-              <a:rPr lang="en-US" sz="2000" b="1" dirty="0" smtClean="0">
-                <a:solidFill>
-                  <a:schemeClr val="bg1">
-                    <a:lumMod val="95000"/>
-                  </a:schemeClr>
-                </a:solidFill>
-              </a:rPr>
-              <a:t>, </a:t>
-            </a:r>
-            <a:r>
-              <a:rPr lang="bg-BG" sz="2000" b="1" dirty="0" smtClean="0">
-                <a:solidFill>
-                  <a:schemeClr val="bg1">
-                    <a:lumMod val="95000"/>
-                  </a:schemeClr>
-                </a:solidFill>
-              </a:rPr>
-              <a:t>направете основната навигация да бъде скрита и да се показва т.нар. хамбургер бутон(упражнено на лекцията).</a:t>
             </a:r>
             <a:endParaRPr lang="bg-BG" sz="2000" b="1" dirty="0" smtClean="0">
               <a:solidFill>
@@ -4154,35 +6048,50 @@
           </a:p>
         </p:txBody>
       </p:sp>
-      <p:pic>
-        <p:nvPicPr>
-          <p:cNvPr id="3" name="Content Placeholder 2"/>
-          <p:cNvPicPr>
-            <a:picLocks noGrp="1" noChangeAspect="1"/>
-          </p:cNvPicPr>
+      <p:sp>
+        <p:nvSpPr>
+          <p:cNvPr id="4" name="Content Placeholder 3"/>
+          <p:cNvSpPr>
+            <a:spLocks noGrp="1"/>
+          </p:cNvSpPr>
           <p:nvPr>
             <p:ph idx="1"/>
           </p:nvPr>
-        </p:nvPicPr>
-        <p:blipFill>
-          <a:blip r:embed="rId2">
-            <a:extLst>
-              <a:ext uri="{28A0092B-C50C-407E-A947-70E740481C1C}">
-                <a14:useLocalDpi xmlns:a14="http://schemas.microsoft.com/office/drawing/2010/main" val="0"/>
-              </a:ext>
-            </a:extLst>
-          </a:blip>
-          <a:stretch>
-            <a:fillRect/>
-          </a:stretch>
-        </p:blipFill>
-        <p:spPr>
-          <a:xfrm>
-            <a:off x="609600" y="1828800"/>
-            <a:ext cx="6565900" cy="3581400"/>
-          </a:xfrm>
-        </p:spPr>
-      </p:pic>
+        </p:nvSpPr>
+        <p:spPr/>
+        <p:txBody>
+          <a:bodyPr/>
+          <a:lstStyle/>
+          <a:p>
+            <a:r>
+              <a:rPr lang="en-US" dirty="0" smtClean="0">
+                <a:solidFill>
+                  <a:schemeClr val="bg1"/>
+                </a:solidFill>
+              </a:rPr>
+              <a:t>Responsive vs adaptive</a:t>
+            </a:r>
+          </a:p>
+          <a:p>
+            <a:r>
+              <a:rPr lang="en-US" dirty="0" smtClean="0">
+                <a:solidFill>
+                  <a:srgbClr val="002060"/>
+                </a:solidFill>
+              </a:rPr>
+              <a:t>https</a:t>
+            </a:r>
+            <a:r>
+              <a:rPr lang="en-US" dirty="0">
+                <a:solidFill>
+                  <a:srgbClr val="002060"/>
+                </a:solidFill>
+              </a:rPr>
+              <a:t>://css-tricks.com/the-difference-between-responsive-and-adaptive-design/</a:t>
+            </a:r>
+          </a:p>
+        </p:txBody>
+      </p:sp>
     </p:spTree>
     <p:extLst>
       <p:ext uri="{BB962C8B-B14F-4D97-AF65-F5344CB8AC3E}">
@@ -4267,96 +6176,39 @@
           </a:p>
         </p:txBody>
       </p:sp>
-      <p:sp>
-        <p:nvSpPr>
-          <p:cNvPr id="6" name="Content Placeholder 5"/>
-          <p:cNvSpPr>
-            <a:spLocks noGrp="1"/>
-          </p:cNvSpPr>
+      <p:pic>
+        <p:nvPicPr>
+          <p:cNvPr id="3" name="Content Placeholder 2"/>
+          <p:cNvPicPr>
+            <a:picLocks noGrp="1" noChangeAspect="1"/>
+          </p:cNvPicPr>
           <p:nvPr>
             <p:ph idx="1"/>
           </p:nvPr>
-        </p:nvSpPr>
+        </p:nvPicPr>
+        <p:blipFill>
+          <a:blip r:embed="rId2">
+            <a:extLst>
+              <a:ext uri="{28A0092B-C50C-407E-A947-70E740481C1C}">
+                <a14:useLocalDpi xmlns:a14="http://schemas.microsoft.com/office/drawing/2010/main" val="0"/>
+              </a:ext>
+            </a:extLst>
+          </a:blip>
+          <a:stretch>
+            <a:fillRect/>
+          </a:stretch>
+        </p:blipFill>
         <p:spPr>
           <a:xfrm>
-            <a:off x="457200" y="1600200"/>
-            <a:ext cx="8229600" cy="4876799"/>
+            <a:off x="609600" y="1828800"/>
+            <a:ext cx="6565900" cy="3581400"/>
           </a:xfrm>
         </p:spPr>
-        <p:txBody>
-          <a:bodyPr>
-            <a:normAutofit/>
-          </a:bodyPr>
-          <a:lstStyle/>
-          <a:p>
-            <a:pPr>
-              <a:buFontTx/>
-              <a:buChar char="-"/>
-            </a:pPr>
-            <a:r>
-              <a:rPr lang="bg-BG" dirty="0" smtClean="0">
-                <a:solidFill>
-                  <a:schemeClr val="bg1"/>
-                </a:solidFill>
-              </a:rPr>
-              <a:t>Разработка на уеб страници, които се адаптират към изполваното устройство и размера му.</a:t>
-            </a:r>
-          </a:p>
-          <a:p>
-            <a:pPr>
-              <a:buFontTx/>
-              <a:buChar char="-"/>
-            </a:pPr>
-            <a:r>
-              <a:rPr lang="bg-BG" dirty="0" smtClean="0">
-                <a:solidFill>
-                  <a:schemeClr val="bg1"/>
-                </a:solidFill>
-              </a:rPr>
-              <a:t>Благодарение на </a:t>
-            </a:r>
-            <a:r>
-              <a:rPr lang="en-US" dirty="0" smtClean="0">
-                <a:solidFill>
-                  <a:schemeClr val="bg1"/>
-                </a:solidFill>
-              </a:rPr>
-              <a:t>responsive web design</a:t>
-            </a:r>
-            <a:r>
-              <a:rPr lang="bg-BG" dirty="0" smtClean="0">
-                <a:solidFill>
-                  <a:schemeClr val="bg1"/>
-                </a:solidFill>
-              </a:rPr>
-              <a:t>, дадена страница може да има различен облик за десктоп, таблет и мобилни устройства.</a:t>
-            </a:r>
-          </a:p>
-          <a:p>
-            <a:pPr>
-              <a:buFontTx/>
-              <a:buChar char="-"/>
-            </a:pPr>
-            <a:r>
-              <a:rPr lang="bg-BG" dirty="0" smtClean="0">
-                <a:solidFill>
-                  <a:schemeClr val="bg1"/>
-                </a:solidFill>
-              </a:rPr>
-              <a:t>Задължителен за разработката на страници, пригодени за таблет и мобилни устройства.</a:t>
-            </a:r>
-            <a:endParaRPr lang="en-US" dirty="0">
-              <a:solidFill>
-                <a:schemeClr val="bg1"/>
-              </a:solidFill>
-            </a:endParaRPr>
-          </a:p>
-        </p:txBody>
-      </p:sp>
+      </p:pic>
     </p:spTree>
     <p:extLst>
       <p:ext uri="{BB962C8B-B14F-4D97-AF65-F5344CB8AC3E}">
-        <p14:creationId xmlns:p14="http://schemas.microsoft.com/office/powerpoint/2010/main" val="3203136504"/>
+        <p14:creationId xmlns:p14="http://schemas.microsoft.com/office/powerpoint/2010/main" val="1455654570"/>
       </p:ext>
     </p:extLst>
   </p:cSld>
@@ -4408,7 +6260,7 @@
         </p:spPr>
         <p:txBody>
           <a:bodyPr>
-            <a:normAutofit/>
+            <a:normAutofit fontScale="90000"/>
           </a:bodyPr>
           <a:lstStyle/>
           <a:p>
@@ -4419,7 +6271,7 @@
                   <a:schemeClr val="accent6"/>
                 </a:solidFill>
               </a:rPr>
-              <a:t>Viewport </a:t>
+              <a:t>Responsive web design – </a:t>
             </a:r>
             <a:r>
               <a:rPr lang="bg-BG" dirty="0" smtClean="0">
@@ -4427,7 +6279,7 @@
                   <a:schemeClr val="accent6"/>
                 </a:solidFill>
               </a:rPr>
-              <a:t>– какво е това?</a:t>
+              <a:t>какво е това?</a:t>
             </a:r>
             <a:endParaRPr lang="bg-BG" dirty="0">
               <a:solidFill>
@@ -4437,78 +6289,85 @@
           </a:p>
         </p:txBody>
       </p:sp>
-      <p:pic>
-        <p:nvPicPr>
-          <p:cNvPr id="7" name="Content Placeholder 6"/>
-          <p:cNvPicPr>
-            <a:picLocks noGrp="1" noChangeAspect="1"/>
-          </p:cNvPicPr>
+      <p:sp>
+        <p:nvSpPr>
+          <p:cNvPr id="6" name="Content Placeholder 5"/>
+          <p:cNvSpPr>
+            <a:spLocks noGrp="1"/>
+          </p:cNvSpPr>
           <p:nvPr>
             <p:ph idx="1"/>
           </p:nvPr>
-        </p:nvPicPr>
-        <p:blipFill>
-          <a:blip r:embed="rId2">
-            <a:extLst>
-              <a:ext uri="{28A0092B-C50C-407E-A947-70E740481C1C}">
-                <a14:useLocalDpi xmlns:a14="http://schemas.microsoft.com/office/drawing/2010/main" val="0"/>
-              </a:ext>
-            </a:extLst>
-          </a:blip>
-          <a:stretch>
-            <a:fillRect/>
-          </a:stretch>
-        </p:blipFill>
+        </p:nvSpPr>
         <p:spPr>
           <a:xfrm>
-            <a:off x="533401" y="3276600"/>
-            <a:ext cx="6781800" cy="3282784"/>
+            <a:off x="457200" y="1600200"/>
+            <a:ext cx="8229600" cy="4876799"/>
           </a:xfrm>
         </p:spPr>
-      </p:pic>
-      <p:sp>
-        <p:nvSpPr>
-          <p:cNvPr id="8" name="TextBox 7"/>
-          <p:cNvSpPr txBox="1"/>
-          <p:nvPr/>
-        </p:nvSpPr>
-        <p:spPr>
-          <a:xfrm>
-            <a:off x="471152" y="1676400"/>
-            <a:ext cx="7987048" cy="2015936"/>
-          </a:xfrm>
-          <a:prstGeom prst="rect">
-            <a:avLst/>
-          </a:prstGeom>
-          <a:noFill/>
-        </p:spPr>
-        <p:txBody>
-          <a:bodyPr wrap="square" rtlCol="0">
-            <a:spAutoFit/>
+        <p:txBody>
+          <a:bodyPr>
+            <a:normAutofit/>
           </a:bodyPr>
           <a:lstStyle/>
           <a:p>
-            <a:r>
-              <a:rPr lang="bg-BG" sz="2500" dirty="0" smtClean="0">
-                <a:solidFill>
-                  <a:schemeClr val="bg1"/>
-                </a:solidFill>
-              </a:rPr>
-              <a:t>Вюпортът е видимата за потребителя област от екрана на използваното устройство. </a:t>
-            </a:r>
-          </a:p>
-          <a:p>
-            <a:r>
-              <a:rPr lang="bg-BG" sz="2500" dirty="0" smtClean="0">
-                <a:solidFill>
-                  <a:schemeClr val="bg1"/>
-                </a:solidFill>
-              </a:rPr>
-              <a:t>Размерът на вюпорта варира, като колкото по-малко е устройството, толкова е по-малък вюпортът.</a:t>
-            </a:r>
-          </a:p>
-          <a:p>
-            <a:endParaRPr lang="en-US" sz="2500" dirty="0">
+            <a:pPr>
+              <a:buFontTx/>
+              <a:buChar char="-"/>
+            </a:pPr>
+            <a:r>
+              <a:rPr lang="bg-BG" dirty="0" smtClean="0">
+                <a:solidFill>
+                  <a:schemeClr val="bg1"/>
+                </a:solidFill>
+              </a:rPr>
+              <a:t>Разработка на уеб страници, които се адаптират към изполваното устройство и размера му.</a:t>
+            </a:r>
+          </a:p>
+          <a:p>
+            <a:pPr>
+              <a:buFontTx/>
+              <a:buChar char="-"/>
+            </a:pPr>
+            <a:r>
+              <a:rPr lang="bg-BG" dirty="0" smtClean="0">
+                <a:solidFill>
+                  <a:schemeClr val="bg1"/>
+                </a:solidFill>
+              </a:rPr>
+              <a:t>Благодарение на </a:t>
+            </a:r>
+            <a:r>
+              <a:rPr lang="en-US" dirty="0" smtClean="0">
+                <a:solidFill>
+                  <a:schemeClr val="bg1"/>
+                </a:solidFill>
+              </a:rPr>
+              <a:t>responsive web design</a:t>
+            </a:r>
+            <a:r>
+              <a:rPr lang="bg-BG" dirty="0" smtClean="0">
+                <a:solidFill>
+                  <a:schemeClr val="bg1"/>
+                </a:solidFill>
+              </a:rPr>
+              <a:t>, дадена страница може да има различен облик за десктоп, таблет и мобилни устройства.</a:t>
+            </a:r>
+          </a:p>
+          <a:p>
+            <a:pPr>
+              <a:buFontTx/>
+              <a:buChar char="-"/>
+            </a:pPr>
+            <a:r>
+              <a:rPr lang="bg-BG" dirty="0" smtClean="0">
+                <a:solidFill>
+                  <a:schemeClr val="bg1"/>
+                </a:solidFill>
+              </a:rPr>
+              <a:t>Задължителен за разработката на страници, пригодени за таблет и мобилни устройства.</a:t>
+            </a:r>
+            <a:endParaRPr lang="en-US" dirty="0">
               <a:solidFill>
                 <a:schemeClr val="bg1"/>
               </a:solidFill>
@@ -4519,7 +6378,7 @@
     </p:spTree>
     <p:extLst>
       <p:ext uri="{BB962C8B-B14F-4D97-AF65-F5344CB8AC3E}">
-        <p14:creationId xmlns:p14="http://schemas.microsoft.com/office/powerpoint/2010/main" val="3423157379"/>
+        <p14:creationId xmlns:p14="http://schemas.microsoft.com/office/powerpoint/2010/main" val="3203136504"/>
       </p:ext>
     </p:extLst>
   </p:cSld>
@@ -4582,7 +6441,15 @@
                   <a:schemeClr val="accent6"/>
                 </a:solidFill>
               </a:rPr>
-              <a:t>Meta viewport</a:t>
+              <a:t>Viewport </a:t>
+            </a:r>
+            <a:r>
+              <a:rPr lang="bg-BG" dirty="0" smtClean="0">
+                <a:solidFill>
+                  <a:schemeClr val="accent6"/>
+                </a:solidFill>
+              </a:rPr>
+              <a:t>– какво е това?</a:t>
             </a:r>
             <a:endParaRPr lang="bg-BG" dirty="0">
               <a:solidFill>
@@ -4592,161 +6459,89 @@
           </a:p>
         </p:txBody>
       </p:sp>
-      <p:sp>
-        <p:nvSpPr>
-          <p:cNvPr id="6" name="Content Placeholder 5"/>
-          <p:cNvSpPr>
-            <a:spLocks noGrp="1"/>
-          </p:cNvSpPr>
+      <p:pic>
+        <p:nvPicPr>
+          <p:cNvPr id="7" name="Content Placeholder 6"/>
+          <p:cNvPicPr>
+            <a:picLocks noGrp="1" noChangeAspect="1"/>
+          </p:cNvPicPr>
           <p:nvPr>
             <p:ph idx="1"/>
           </p:nvPr>
-        </p:nvSpPr>
+        </p:nvPicPr>
+        <p:blipFill>
+          <a:blip r:embed="rId2">
+            <a:extLst>
+              <a:ext uri="{28A0092B-C50C-407E-A947-70E740481C1C}">
+                <a14:useLocalDpi xmlns:a14="http://schemas.microsoft.com/office/drawing/2010/main" val="0"/>
+              </a:ext>
+            </a:extLst>
+          </a:blip>
+          <a:stretch>
+            <a:fillRect/>
+          </a:stretch>
+        </p:blipFill>
         <p:spPr>
           <a:xfrm>
-            <a:off x="457200" y="1600200"/>
-            <a:ext cx="8229600" cy="4876799"/>
+            <a:off x="533401" y="3276600"/>
+            <a:ext cx="6781800" cy="3282784"/>
           </a:xfrm>
         </p:spPr>
-        <p:txBody>
-          <a:bodyPr>
-            <a:normAutofit/>
+      </p:pic>
+      <p:sp>
+        <p:nvSpPr>
+          <p:cNvPr id="8" name="TextBox 7"/>
+          <p:cNvSpPr txBox="1"/>
+          <p:nvPr/>
+        </p:nvSpPr>
+        <p:spPr>
+          <a:xfrm>
+            <a:off x="471152" y="1676400"/>
+            <a:ext cx="7987048" cy="2015936"/>
+          </a:xfrm>
+          <a:prstGeom prst="rect">
+            <a:avLst/>
+          </a:prstGeom>
+          <a:noFill/>
+        </p:spPr>
+        <p:txBody>
+          <a:bodyPr wrap="square" rtlCol="0">
+            <a:spAutoFit/>
           </a:bodyPr>
           <a:lstStyle/>
           <a:p>
-            <a:pPr marL="0" indent="0">
-              <a:buNone/>
-            </a:pPr>
-            <a:r>
-              <a:rPr lang="en-US" dirty="0">
-                <a:solidFill>
-                  <a:schemeClr val="bg1"/>
-                </a:solidFill>
-              </a:rPr>
-              <a:t>v</a:t>
-            </a:r>
-            <a:r>
-              <a:rPr lang="en-US" dirty="0" smtClean="0">
-                <a:solidFill>
-                  <a:schemeClr val="bg1"/>
-                </a:solidFill>
-              </a:rPr>
-              <a:t>iewport – </a:t>
-            </a:r>
-            <a:r>
-              <a:rPr lang="bg-BG" dirty="0" smtClean="0">
-                <a:solidFill>
-                  <a:schemeClr val="bg1"/>
-                </a:solidFill>
-              </a:rPr>
-              <a:t>Указва на браузъра как да контролира размера и скалирането на страницата</a:t>
-            </a:r>
-            <a:endParaRPr lang="en-US" dirty="0" smtClean="0">
+            <a:r>
+              <a:rPr lang="bg-BG" sz="2500" dirty="0" smtClean="0">
+                <a:solidFill>
+                  <a:schemeClr val="bg1"/>
+                </a:solidFill>
+              </a:rPr>
+              <a:t>Вюпортът е видимата за потребителя област от екрана на използваното устройство. </a:t>
+            </a:r>
+          </a:p>
+          <a:p>
+            <a:r>
+              <a:rPr lang="bg-BG" sz="2500" dirty="0" smtClean="0">
+                <a:solidFill>
+                  <a:schemeClr val="bg1"/>
+                </a:solidFill>
+              </a:rPr>
+              <a:t>Размерът на вюпорта варира, като колкото по-малко е устройството, толкова е по-малък вюпортът.</a:t>
+            </a:r>
+          </a:p>
+          <a:p>
+            <a:endParaRPr lang="en-US" sz="2500" dirty="0">
               <a:solidFill>
                 <a:schemeClr val="bg1"/>
               </a:solidFill>
             </a:endParaRPr>
           </a:p>
-          <a:p>
-            <a:pPr marL="0" indent="0">
-              <a:buNone/>
-            </a:pPr>
-            <a:r>
-              <a:rPr lang="en-US" sz="2000" dirty="0">
-                <a:solidFill>
-                  <a:schemeClr val="bg1"/>
-                </a:solidFill>
-              </a:rPr>
-              <a:t>&lt;meta name="viewport" content="width=device-width, initial-scale=1</a:t>
-            </a:r>
-            <a:r>
-              <a:rPr lang="en-US" sz="2000" dirty="0" smtClean="0">
-                <a:solidFill>
-                  <a:schemeClr val="bg1"/>
-                </a:solidFill>
-              </a:rPr>
-              <a:t>"&gt;</a:t>
-            </a:r>
-          </a:p>
-          <a:p>
-            <a:pPr marL="0" indent="0">
-              <a:buNone/>
-            </a:pPr>
-            <a:r>
-              <a:rPr lang="en-US" sz="2000" dirty="0" smtClean="0">
-                <a:solidFill>
-                  <a:schemeClr val="bg1"/>
-                </a:solidFill>
-              </a:rPr>
-              <a:t>width=device-width – </a:t>
-            </a:r>
-            <a:r>
-              <a:rPr lang="bg-BG" sz="2000" dirty="0" smtClean="0">
-                <a:solidFill>
-                  <a:schemeClr val="bg1"/>
-                </a:solidFill>
-              </a:rPr>
-              <a:t>указва на страницата да използва широчината на устройството</a:t>
-            </a:r>
-          </a:p>
-          <a:p>
-            <a:pPr marL="0" indent="0">
-              <a:buNone/>
-            </a:pPr>
-            <a:r>
-              <a:rPr lang="en-US" sz="2000" dirty="0" smtClean="0">
-                <a:solidFill>
-                  <a:schemeClr val="bg1"/>
-                </a:solidFill>
-              </a:rPr>
-              <a:t>initial-scale=1</a:t>
-            </a:r>
-            <a:r>
-              <a:rPr lang="bg-BG" sz="2000" dirty="0" smtClean="0">
-                <a:solidFill>
-                  <a:schemeClr val="bg1"/>
-                </a:solidFill>
-              </a:rPr>
-              <a:t>- указва на страницата да изгради връзка 1:1 между </a:t>
-            </a:r>
-            <a:r>
-              <a:rPr lang="en-US" sz="2000" dirty="0" smtClean="0">
-                <a:solidFill>
-                  <a:schemeClr val="bg1"/>
-                </a:solidFill>
-              </a:rPr>
-              <a:t>CSS </a:t>
-            </a:r>
-            <a:r>
-              <a:rPr lang="bg-BG" sz="2000" dirty="0" smtClean="0">
-                <a:solidFill>
-                  <a:schemeClr val="bg1"/>
-                </a:solidFill>
-              </a:rPr>
-              <a:t>пикселите и пикселите в страницата</a:t>
-            </a:r>
-            <a:endParaRPr lang="en-US" sz="2000" dirty="0" smtClean="0">
-              <a:solidFill>
-                <a:schemeClr val="bg1"/>
-              </a:solidFill>
-            </a:endParaRPr>
-          </a:p>
-          <a:p>
-            <a:pPr marL="0" indent="0">
-              <a:buNone/>
-            </a:pPr>
-            <a:endParaRPr lang="en-US" dirty="0">
-              <a:solidFill>
-                <a:schemeClr val="bg1"/>
-              </a:solidFill>
-            </a:endParaRPr>
-          </a:p>
         </p:txBody>
       </p:sp>
     </p:spTree>
     <p:extLst>
       <p:ext uri="{BB962C8B-B14F-4D97-AF65-F5344CB8AC3E}">
-        <p14:creationId xmlns:p14="http://schemas.microsoft.com/office/powerpoint/2010/main" val="654874770"/>
+        <p14:creationId xmlns:p14="http://schemas.microsoft.com/office/powerpoint/2010/main" val="3423157379"/>
       </p:ext>
     </p:extLst>
   </p:cSld>
@@ -4809,7 +6604,7 @@
                   <a:schemeClr val="accent6"/>
                 </a:solidFill>
               </a:rPr>
-              <a:t>Content width</a:t>
+              <a:t>Meta viewport</a:t>
             </a:r>
             <a:endParaRPr lang="bg-BG" dirty="0">
               <a:solidFill>
@@ -4845,36 +6640,28 @@
               <a:buNone/>
             </a:pPr>
             <a:r>
+              <a:rPr lang="en-US" dirty="0">
+                <a:solidFill>
+                  <a:schemeClr val="bg1"/>
+                </a:solidFill>
+              </a:rPr>
+              <a:t>v</a:t>
+            </a:r>
+            <a:r>
+              <a:rPr lang="en-US" dirty="0" smtClean="0">
+                <a:solidFill>
+                  <a:schemeClr val="bg1"/>
+                </a:solidFill>
+              </a:rPr>
+              <a:t>iewport – </a:t>
+            </a:r>
+            <a:r>
               <a:rPr lang="bg-BG" dirty="0" smtClean="0">
                 <a:solidFill>
                   <a:schemeClr val="bg1"/>
                 </a:solidFill>
               </a:rPr>
-              <a:t>Съдържанието на сайта ни не трябва да бъде с голяма широчина(&gt;1200</a:t>
-            </a:r>
-            <a:r>
-              <a:rPr lang="en-US" dirty="0" err="1" smtClean="0">
-                <a:solidFill>
-                  <a:schemeClr val="bg1"/>
-                </a:solidFill>
-              </a:rPr>
-              <a:t>px</a:t>
-            </a:r>
-            <a:r>
-              <a:rPr lang="en-US" dirty="0" smtClean="0">
-                <a:solidFill>
-                  <a:schemeClr val="bg1"/>
-                </a:solidFill>
-              </a:rPr>
-              <a:t>)</a:t>
-            </a:r>
-            <a:r>
-              <a:rPr lang="bg-BG" dirty="0" smtClean="0">
-                <a:solidFill>
-                  <a:schemeClr val="bg1"/>
-                </a:solidFill>
-              </a:rPr>
-              <a:t>.</a:t>
+              <a:t>Указва на браузъра как да контролира размера и скалирането на страницата</a:t>
             </a:r>
             <a:endParaRPr lang="en-US" dirty="0" smtClean="0">
               <a:solidFill>
@@ -4887,28 +6674,20 @@
               <a:buNone/>
             </a:pPr>
             <a:r>
-              <a:rPr lang="bg-BG" dirty="0" smtClean="0">
-                <a:solidFill>
-                  <a:schemeClr val="bg1"/>
-                </a:solidFill>
-              </a:rPr>
-              <a:t>Широчината на съдържанието не трябва да зависи от даден </a:t>
-            </a:r>
-            <a:r>
-              <a:rPr lang="en-US" dirty="0" smtClean="0">
-                <a:solidFill>
-                  <a:schemeClr val="bg1"/>
-                </a:solidFill>
-              </a:rPr>
-              <a:t>viewport</a:t>
-            </a:r>
-            <a:r>
-              <a:rPr lang="bg-BG" dirty="0" smtClean="0">
-                <a:solidFill>
-                  <a:schemeClr val="bg1"/>
-                </a:solidFill>
-              </a:rPr>
-              <a:t>.</a:t>
+              <a:rPr lang="en-US" sz="2000" dirty="0">
+                <a:solidFill>
+                  <a:schemeClr val="bg1"/>
+                </a:solidFill>
+              </a:rPr>
+              <a:t>&lt;meta name="viewport" content="width=device-width, initial-scale=1</a:t>
+            </a:r>
+            <a:r>
+              <a:rPr lang="en-US" sz="2000" dirty="0" smtClean="0">
+                <a:solidFill>
+                  <a:schemeClr val="bg1"/>
+                </a:solidFill>
+              </a:rPr>
+              <a:t>"&gt;</a:t>
             </a:r>
           </a:p>
           <a:p>
@@ -4916,29 +6695,68 @@
               <a:buNone/>
             </a:pPr>
             <a:r>
-              <a:rPr lang="bg-BG" dirty="0" smtClean="0">
-                <a:solidFill>
-                  <a:schemeClr val="bg1"/>
-                </a:solidFill>
-              </a:rPr>
-              <a:t>Използват се т.нар. </a:t>
-            </a:r>
-            <a:r>
-              <a:rPr lang="en-US" dirty="0" smtClean="0">
-                <a:solidFill>
-                  <a:schemeClr val="bg1"/>
-                </a:solidFill>
-              </a:rPr>
-              <a:t>media queries</a:t>
-            </a:r>
-            <a:r>
-              <a:rPr lang="bg-BG" dirty="0" smtClean="0">
-                <a:solidFill>
-                  <a:schemeClr val="bg1"/>
-                </a:solidFill>
-              </a:rPr>
-              <a:t>, за различна стилизация в различни устройства.</a:t>
-            </a:r>
+              <a:rPr lang="en-US" sz="2000" dirty="0" smtClean="0">
+                <a:solidFill>
+                  <a:schemeClr val="bg1"/>
+                </a:solidFill>
+              </a:rPr>
+              <a:t>width=device-width – </a:t>
+            </a:r>
+            <a:r>
+              <a:rPr lang="bg-BG" sz="2000" dirty="0" smtClean="0">
+                <a:solidFill>
+                  <a:schemeClr val="bg1"/>
+                </a:solidFill>
+              </a:rPr>
+              <a:t>указва на страницата да използва широчината на устройството</a:t>
+            </a:r>
+          </a:p>
+          <a:p>
+            <a:pPr marL="0" indent="0">
+              <a:buNone/>
+            </a:pPr>
+            <a:r>
+              <a:rPr lang="en-US" sz="2000" dirty="0" smtClean="0">
+                <a:solidFill>
+                  <a:schemeClr val="bg1"/>
+                </a:solidFill>
+              </a:rPr>
+              <a:t>initial-scale=1</a:t>
+            </a:r>
+            <a:r>
+              <a:rPr lang="bg-BG" sz="2000" dirty="0" smtClean="0">
+                <a:solidFill>
+                  <a:schemeClr val="bg1"/>
+                </a:solidFill>
+              </a:rPr>
+              <a:t>- указва на страницата да изгради връзка 1:1 между </a:t>
+            </a:r>
+            <a:r>
+              <a:rPr lang="en-US" sz="2000" dirty="0" smtClean="0">
+                <a:solidFill>
+                  <a:schemeClr val="bg1"/>
+                </a:solidFill>
+              </a:rPr>
+              <a:t>CSS </a:t>
+            </a:r>
+            <a:r>
+              <a:rPr lang="bg-BG" sz="2000" dirty="0" smtClean="0">
+                <a:solidFill>
+                  <a:schemeClr val="bg1"/>
+                </a:solidFill>
+              </a:rPr>
+              <a:t>пикселите и пикселите в страницата</a:t>
+            </a:r>
+            <a:endParaRPr lang="en-US" sz="2000" dirty="0" smtClean="0">
+              <a:solidFill>
+                <a:schemeClr val="bg1"/>
+              </a:solidFill>
+            </a:endParaRPr>
+          </a:p>
+          <a:p>
+            <a:pPr marL="0" indent="0">
+              <a:buNone/>
+            </a:pPr>
             <a:endParaRPr lang="en-US" dirty="0">
               <a:solidFill>
                 <a:schemeClr val="bg1"/>
@@ -4950,7 +6768,7 @@
     </p:spTree>
     <p:extLst>
       <p:ext uri="{BB962C8B-B14F-4D97-AF65-F5344CB8AC3E}">
-        <p14:creationId xmlns:p14="http://schemas.microsoft.com/office/powerpoint/2010/main" val="2105775442"/>
+        <p14:creationId xmlns:p14="http://schemas.microsoft.com/office/powerpoint/2010/main" val="654874770"/>
       </p:ext>
     </p:extLst>
   </p:cSld>
@@ -5013,7 +6831,7 @@
                   <a:schemeClr val="accent6"/>
                 </a:solidFill>
               </a:rPr>
-              <a:t>CSS Media Queries</a:t>
+              <a:t>Fixed Layout vs. Fluid Layout </a:t>
             </a:r>
             <a:endParaRPr lang="bg-BG" dirty="0">
               <a:solidFill>
@@ -5049,69 +6867,18 @@
               <a:buNone/>
             </a:pPr>
             <a:r>
-              <a:rPr lang="en-US" dirty="0" smtClean="0">
-                <a:solidFill>
-                  <a:schemeClr val="bg1"/>
-                </a:solidFill>
-              </a:rPr>
-              <a:t>Media Queries </a:t>
-            </a:r>
-            <a:r>
               <a:rPr lang="bg-BG" dirty="0" smtClean="0">
                 <a:solidFill>
                   <a:schemeClr val="bg1"/>
                 </a:solidFill>
               </a:rPr>
-              <a:t>най-общо са начин, по който може да се стилизира страница в определена резолюция, като с </a:t>
-            </a:r>
-            <a:r>
-              <a:rPr lang="en-US" dirty="0" smtClean="0">
-                <a:solidFill>
-                  <a:schemeClr val="bg1"/>
-                </a:solidFill>
-              </a:rPr>
-              <a:t>N </a:t>
-            </a:r>
-            <a:r>
-              <a:rPr lang="bg-BG" dirty="0" smtClean="0">
-                <a:solidFill>
-                  <a:schemeClr val="bg1"/>
-                </a:solidFill>
-              </a:rPr>
-              <a:t>на брой </a:t>
-            </a:r>
-            <a:r>
-              <a:rPr lang="en-US" dirty="0" smtClean="0">
-                <a:solidFill>
-                  <a:schemeClr val="bg1"/>
-                </a:solidFill>
-              </a:rPr>
-              <a:t>media queries </a:t>
-            </a:r>
-            <a:r>
-              <a:rPr lang="bg-BG" dirty="0" smtClean="0">
-                <a:solidFill>
-                  <a:schemeClr val="bg1"/>
-                </a:solidFill>
-              </a:rPr>
-              <a:t>могат да се стилизират </a:t>
-            </a:r>
-            <a:r>
-              <a:rPr lang="en-US" dirty="0" smtClean="0">
-                <a:solidFill>
-                  <a:schemeClr val="bg1"/>
-                </a:solidFill>
-              </a:rPr>
-              <a:t>N </a:t>
-            </a:r>
-            <a:r>
-              <a:rPr lang="bg-BG" dirty="0" smtClean="0">
-                <a:solidFill>
-                  <a:schemeClr val="bg1"/>
-                </a:solidFill>
-              </a:rPr>
-              <a:t>на брой устройства. Абстрактно определяни като „филтри“.</a:t>
-            </a:r>
+              <a:t>При фиксирания имаме зададени фиксирани стойности в пиксали</a:t>
+            </a:r>
+          </a:p>
+          <a:p>
+            <a:pPr marL="0" indent="0">
+              <a:buNone/>
+            </a:pPr>
             <a:endParaRPr lang="en-US" dirty="0">
               <a:solidFill>
                 <a:schemeClr val="bg1"/>
@@ -5120,10 +6887,40 @@
           </a:p>
         </p:txBody>
       </p:sp>
+      <p:pic>
+        <p:nvPicPr>
+          <p:cNvPr id="3" name="Picture 2"/>
+          <p:cNvPicPr>
+            <a:picLocks noChangeAspect="1"/>
+          </p:cNvPicPr>
+          <p:nvPr/>
+        </p:nvPicPr>
+        <p:blipFill>
+          <a:blip r:embed="rId2">
+            <a:extLst>
+              <a:ext uri="{28A0092B-C50C-407E-A947-70E740481C1C}">
+                <a14:useLocalDpi xmlns:a14="http://schemas.microsoft.com/office/drawing/2010/main" val="0"/>
+              </a:ext>
+            </a:extLst>
+          </a:blip>
+          <a:stretch>
+            <a:fillRect/>
+          </a:stretch>
+        </p:blipFill>
+        <p:spPr>
+          <a:xfrm>
+            <a:off x="1524000" y="2743200"/>
+            <a:ext cx="5867400" cy="3770558"/>
+          </a:xfrm>
+          <a:prstGeom prst="rect">
+            <a:avLst/>
+          </a:prstGeom>
+        </p:spPr>
+      </p:pic>
     </p:spTree>
     <p:extLst>
       <p:ext uri="{BB962C8B-B14F-4D97-AF65-F5344CB8AC3E}">
-        <p14:creationId xmlns:p14="http://schemas.microsoft.com/office/powerpoint/2010/main" val="2202466883"/>
+        <p14:creationId xmlns:p14="http://schemas.microsoft.com/office/powerpoint/2010/main" val="1938935986"/>
       </p:ext>
     </p:extLst>
   </p:cSld>
@@ -5186,15 +6983,7 @@
                   <a:schemeClr val="accent6"/>
                 </a:solidFill>
               </a:rPr>
-              <a:t>CSS Media Queries</a:t>
-            </a:r>
-            <a:r>
-              <a:rPr lang="bg-BG" dirty="0" smtClean="0">
-                <a:solidFill>
-                  <a:schemeClr val="accent6"/>
-                </a:solidFill>
-              </a:rPr>
-              <a:t> - свойства</a:t>
+              <a:t>Fixed Layout vs. Fluid Layout </a:t>
             </a:r>
             <a:endParaRPr lang="bg-BG" dirty="0">
               <a:solidFill>
@@ -5222,256 +7011,81 @@
         </p:spPr>
         <p:txBody>
           <a:bodyPr>
-            <a:normAutofit fontScale="77500" lnSpcReduction="20000"/>
+            <a:normAutofit/>
           </a:bodyPr>
           <a:lstStyle/>
           <a:p>
-            <a:r>
-              <a:rPr lang="en-US" dirty="0" smtClean="0">
-                <a:solidFill>
-                  <a:schemeClr val="bg1"/>
-                </a:solidFill>
-              </a:rPr>
-              <a:t>min-width</a:t>
-            </a:r>
+            <a:pPr marL="0" indent="0">
+              <a:buNone/>
+            </a:pPr>
             <a:r>
               <a:rPr lang="bg-BG" dirty="0" smtClean="0">
                 <a:solidFill>
                   <a:schemeClr val="bg1"/>
                 </a:solidFill>
               </a:rPr>
-              <a:t> - свойство, с което се стилизират страници в устройства с широчина, по-голяма от определена</a:t>
-            </a:r>
+              <a:t>При </a:t>
+            </a:r>
+            <a:r>
+              <a:rPr lang="bg-BG" dirty="0" smtClean="0">
+                <a:solidFill>
+                  <a:schemeClr val="bg1"/>
+                </a:solidFill>
+              </a:rPr>
+              <a:t>флуидния размерите се задават пропорционално</a:t>
+            </a:r>
+            <a:endParaRPr lang="bg-BG" dirty="0" smtClean="0">
+              <a:solidFill>
+                <a:schemeClr val="bg1"/>
+              </a:solidFill>
+            </a:endParaRPr>
+          </a:p>
+          <a:p>
+            <a:pPr marL="0" indent="0">
+              <a:buNone/>
+            </a:pPr>
             <a:endParaRPr lang="en-US" dirty="0">
               <a:solidFill>
                 <a:schemeClr val="bg1"/>
               </a:solidFill>
             </a:endParaRPr>
           </a:p>
-          <a:p>
-            <a:r>
-              <a:rPr lang="en-US" dirty="0" smtClean="0">
-                <a:solidFill>
-                  <a:schemeClr val="bg1"/>
-                </a:solidFill>
-              </a:rPr>
-              <a:t>max-width</a:t>
-            </a:r>
-            <a:r>
-              <a:rPr lang="bg-BG" dirty="0">
-                <a:solidFill>
-                  <a:schemeClr val="bg1"/>
-                </a:solidFill>
-              </a:rPr>
-              <a:t> </a:t>
-            </a:r>
-            <a:r>
-              <a:rPr lang="bg-BG" dirty="0" smtClean="0">
-                <a:solidFill>
-                  <a:schemeClr val="bg1"/>
-                </a:solidFill>
-              </a:rPr>
-              <a:t>- </a:t>
-            </a:r>
-            <a:r>
-              <a:rPr lang="bg-BG" dirty="0">
-                <a:solidFill>
-                  <a:schemeClr val="bg1"/>
-                </a:solidFill>
-              </a:rPr>
-              <a:t>свойство, с което се стилизират </a:t>
-            </a:r>
-            <a:r>
-              <a:rPr lang="bg-BG" dirty="0" smtClean="0">
-                <a:solidFill>
-                  <a:schemeClr val="bg1"/>
-                </a:solidFill>
-              </a:rPr>
-              <a:t>страници </a:t>
-            </a:r>
-            <a:r>
-              <a:rPr lang="bg-BG" dirty="0">
-                <a:solidFill>
-                  <a:schemeClr val="bg1"/>
-                </a:solidFill>
-              </a:rPr>
-              <a:t>в устройства </a:t>
-            </a:r>
-            <a:r>
-              <a:rPr lang="bg-BG" dirty="0" smtClean="0">
-                <a:solidFill>
-                  <a:schemeClr val="bg1"/>
-                </a:solidFill>
-              </a:rPr>
-              <a:t>с широчина, по-малка от определена</a:t>
-            </a:r>
-          </a:p>
-          <a:p>
-            <a:r>
-              <a:rPr lang="en-US" dirty="0" smtClean="0">
-                <a:solidFill>
-                  <a:schemeClr val="bg1"/>
-                </a:solidFill>
-              </a:rPr>
-              <a:t>min-height</a:t>
-            </a:r>
-            <a:r>
-              <a:rPr lang="bg-BG" dirty="0" smtClean="0">
-                <a:solidFill>
-                  <a:schemeClr val="bg1"/>
-                </a:solidFill>
-              </a:rPr>
-              <a:t> - </a:t>
-            </a:r>
-            <a:r>
-              <a:rPr lang="bg-BG" dirty="0">
-                <a:solidFill>
-                  <a:schemeClr val="bg1"/>
-                </a:solidFill>
-              </a:rPr>
-              <a:t>свойство, с което се стилизират страници в устройства </a:t>
-            </a:r>
-            <a:r>
-              <a:rPr lang="bg-BG" dirty="0" smtClean="0">
-                <a:solidFill>
-                  <a:schemeClr val="bg1"/>
-                </a:solidFill>
-              </a:rPr>
-              <a:t>с височина, по-голяма </a:t>
-            </a:r>
-            <a:r>
-              <a:rPr lang="bg-BG" dirty="0">
-                <a:solidFill>
-                  <a:schemeClr val="bg1"/>
-                </a:solidFill>
-              </a:rPr>
-              <a:t>от определена </a:t>
-            </a:r>
-            <a:endParaRPr lang="bg-BG" dirty="0" smtClean="0">
-              <a:solidFill>
-                <a:schemeClr val="bg1"/>
-              </a:solidFill>
-            </a:endParaRPr>
-          </a:p>
-          <a:p>
-            <a:r>
-              <a:rPr lang="en-US" dirty="0" smtClean="0">
-                <a:solidFill>
-                  <a:schemeClr val="bg1"/>
-                </a:solidFill>
-              </a:rPr>
-              <a:t>max-height</a:t>
-            </a:r>
-            <a:r>
-              <a:rPr lang="bg-BG" dirty="0" smtClean="0">
-                <a:solidFill>
-                  <a:schemeClr val="bg1"/>
-                </a:solidFill>
-              </a:rPr>
-              <a:t> - </a:t>
-            </a:r>
-            <a:r>
-              <a:rPr lang="bg-BG" dirty="0">
-                <a:solidFill>
-                  <a:schemeClr val="bg1"/>
-                </a:solidFill>
-              </a:rPr>
-              <a:t>свойство, с което се стилизират страници в устройства </a:t>
-            </a:r>
-            <a:r>
-              <a:rPr lang="bg-BG" dirty="0" smtClean="0">
-                <a:solidFill>
-                  <a:schemeClr val="bg1"/>
-                </a:solidFill>
-              </a:rPr>
-              <a:t>с височина, </a:t>
-            </a:r>
-            <a:r>
-              <a:rPr lang="bg-BG" dirty="0">
-                <a:solidFill>
-                  <a:schemeClr val="bg1"/>
-                </a:solidFill>
-              </a:rPr>
-              <a:t>по-малка от определена </a:t>
-            </a:r>
-            <a:r>
-              <a:rPr lang="en-US" dirty="0" smtClean="0">
-                <a:solidFill>
-                  <a:schemeClr val="bg1"/>
-                </a:solidFill>
-              </a:rPr>
-              <a:t>orientation=portrait</a:t>
-            </a:r>
-            <a:r>
-              <a:rPr lang="bg-BG" dirty="0" smtClean="0">
-                <a:solidFill>
-                  <a:schemeClr val="bg1"/>
-                </a:solidFill>
-              </a:rPr>
-              <a:t> - </a:t>
-            </a:r>
-            <a:r>
-              <a:rPr lang="bg-BG" dirty="0">
-                <a:solidFill>
-                  <a:schemeClr val="bg1"/>
-                </a:solidFill>
-              </a:rPr>
-              <a:t>свойство, с което се стилизират страници в устройства </a:t>
-            </a:r>
-            <a:r>
-              <a:rPr lang="bg-BG" dirty="0" smtClean="0">
-                <a:solidFill>
-                  <a:schemeClr val="bg1"/>
-                </a:solidFill>
-              </a:rPr>
-              <a:t>с ориентация портрет</a:t>
-            </a:r>
-          </a:p>
-          <a:p>
-            <a:r>
-              <a:rPr lang="en-US" dirty="0" smtClean="0">
-                <a:solidFill>
-                  <a:schemeClr val="bg1"/>
-                </a:solidFill>
-              </a:rPr>
-              <a:t>orientation=landscape - </a:t>
-            </a:r>
-            <a:r>
-              <a:rPr lang="bg-BG" dirty="0" smtClean="0">
-                <a:solidFill>
-                  <a:schemeClr val="bg1"/>
-                </a:solidFill>
-              </a:rPr>
-              <a:t>свойство</a:t>
-            </a:r>
-            <a:r>
-              <a:rPr lang="bg-BG" dirty="0">
-                <a:solidFill>
-                  <a:schemeClr val="bg1"/>
-                </a:solidFill>
-              </a:rPr>
-              <a:t>, с което се стилизират страници в устройства с ориентация </a:t>
-            </a:r>
-            <a:r>
-              <a:rPr lang="bg-BG" dirty="0" smtClean="0">
-                <a:solidFill>
-                  <a:schemeClr val="bg1"/>
-                </a:solidFill>
-              </a:rPr>
-              <a:t>пейзаж</a:t>
-            </a:r>
-            <a:endParaRPr lang="en-US" dirty="0">
-              <a:solidFill>
-                <a:schemeClr val="bg1"/>
-              </a:solidFill>
-            </a:endParaRPr>
-          </a:p>
-        </p:txBody>
-      </p:sp>
+        </p:txBody>
+      </p:sp>
+      <p:pic>
+        <p:nvPicPr>
+          <p:cNvPr id="4" name="Picture 3"/>
+          <p:cNvPicPr>
+            <a:picLocks noChangeAspect="1"/>
+          </p:cNvPicPr>
+          <p:nvPr/>
+        </p:nvPicPr>
+        <p:blipFill>
+          <a:blip r:embed="rId2">
+            <a:extLst>
+              <a:ext uri="{28A0092B-C50C-407E-A947-70E740481C1C}">
+                <a14:useLocalDpi xmlns:a14="http://schemas.microsoft.com/office/drawing/2010/main" val="0"/>
+              </a:ext>
+            </a:extLst>
+          </a:blip>
+          <a:stretch>
+            <a:fillRect/>
+          </a:stretch>
+        </p:blipFill>
+        <p:spPr>
+          <a:xfrm>
+            <a:off x="1397000" y="2743200"/>
+            <a:ext cx="5994400" cy="3733799"/>
+          </a:xfrm>
+          <a:prstGeom prst="rect">
+            <a:avLst/>
+          </a:prstGeom>
+        </p:spPr>
+      </p:pic>
     </p:spTree>
     <p:extLst>
       <p:ext uri="{BB962C8B-B14F-4D97-AF65-F5344CB8AC3E}">
-        <p14:creationId xmlns:p14="http://schemas.microsoft.com/office/powerpoint/2010/main" val="3239949839"/>
+        <p14:creationId xmlns:p14="http://schemas.microsoft.com/office/powerpoint/2010/main" val="371470794"/>
       </p:ext>
     </p:extLst>
   </p:cSld>
@@ -5534,15 +7148,7 @@
                   <a:schemeClr val="accent6"/>
                 </a:solidFill>
               </a:rPr>
-              <a:t>CSS Media Queries</a:t>
-            </a:r>
-            <a:r>
-              <a:rPr lang="bg-BG" dirty="0" smtClean="0">
-                <a:solidFill>
-                  <a:schemeClr val="accent6"/>
-                </a:solidFill>
-              </a:rPr>
-              <a:t> - пример</a:t>
+              <a:t>Responsive images</a:t>
             </a:r>
             <a:endParaRPr lang="bg-BG" dirty="0">
               <a:solidFill>
@@ -5578,244 +7184,91 @@
               <a:buNone/>
             </a:pPr>
             <a:r>
-              <a:rPr lang="en-US" sz="1500" dirty="0" smtClean="0">
-                <a:solidFill>
-                  <a:schemeClr val="bg1"/>
-                </a:solidFill>
-                <a:latin typeface="Courier New" panose="02070309020205020404" pitchFamily="49" charset="0"/>
-                <a:cs typeface="Courier New" panose="02070309020205020404" pitchFamily="49" charset="0"/>
-              </a:rPr>
-              <a:t>.wrapper {</a:t>
-            </a:r>
+              <a:rPr lang="bg-BG" dirty="0" smtClean="0">
+                <a:solidFill>
+                  <a:schemeClr val="bg1"/>
+                </a:solidFill>
+              </a:rPr>
+              <a:t>На картинките се задава фиксиране широчина, но в последствие тя се ограничава до големината на родителя си</a:t>
+            </a:r>
+            <a:br>
+              <a:rPr lang="bg-BG" dirty="0" smtClean="0">
+                <a:solidFill>
+                  <a:schemeClr val="bg1"/>
+                </a:solidFill>
+              </a:rPr>
+            </a:br>
+            <a:r>
+              <a:rPr lang="bg-BG" dirty="0" smtClean="0">
+                <a:solidFill>
+                  <a:schemeClr val="bg1"/>
+                </a:solidFill>
+              </a:rPr>
+              <a:t/>
+            </a:r>
+            <a:br>
+              <a:rPr lang="bg-BG" dirty="0" smtClean="0">
+                <a:solidFill>
+                  <a:schemeClr val="bg1"/>
+                </a:solidFill>
+              </a:rPr>
+            </a:br>
+            <a:r>
+              <a:rPr lang="en-US" b="1" dirty="0" err="1">
+                <a:solidFill>
+                  <a:srgbClr val="00B050"/>
+                </a:solidFill>
+                <a:effectLst>
+                  <a:outerShdw blurRad="38100" dist="38100" dir="2700000" algn="tl">
+                    <a:srgbClr val="000000">
+                      <a:alpha val="43137"/>
+                    </a:srgbClr>
+                  </a:outerShdw>
+                </a:effectLst>
+                <a:latin typeface="Consolas" pitchFamily="49" charset="0"/>
+                <a:cs typeface="Consolas" pitchFamily="49" charset="0"/>
+              </a:rPr>
+              <a:t>img</a:t>
+            </a:r>
+            <a:r>
+              <a:rPr lang="en-US" b="1" dirty="0">
+                <a:solidFill>
+                  <a:srgbClr val="00B050"/>
+                </a:solidFill>
+                <a:effectLst>
+                  <a:outerShdw blurRad="38100" dist="38100" dir="2700000" algn="tl">
+                    <a:srgbClr val="000000">
+                      <a:alpha val="43137"/>
+                    </a:srgbClr>
+                  </a:outerShdw>
+                </a:effectLst>
+                <a:latin typeface="Consolas" pitchFamily="49" charset="0"/>
+                <a:cs typeface="Consolas" pitchFamily="49" charset="0"/>
+              </a:rPr>
+              <a:t> { max-width:100%}</a:t>
+            </a:r>
+            <a:endParaRPr lang="bg-BG" dirty="0" smtClean="0">
+              <a:solidFill>
+                <a:srgbClr val="00B050"/>
+              </a:solidFill>
+            </a:endParaRPr>
           </a:p>
           <a:p>
             <a:pPr marL="0" indent="0">
               <a:buNone/>
             </a:pPr>
-            <a:r>
-              <a:rPr lang="en-US" sz="1500" dirty="0" smtClean="0">
-                <a:solidFill>
-                  <a:schemeClr val="bg1"/>
-                </a:solidFill>
-                <a:latin typeface="Courier New" panose="02070309020205020404" pitchFamily="49" charset="0"/>
-                <a:cs typeface="Courier New" panose="02070309020205020404" pitchFamily="49" charset="0"/>
-              </a:rPr>
-              <a:t>    width: 960px;</a:t>
-            </a:r>
-          </a:p>
-          <a:p>
-            <a:pPr marL="0" indent="0">
-              <a:buNone/>
-            </a:pPr>
-            <a:r>
-              <a:rPr lang="en-US" sz="1500" smtClean="0">
-                <a:solidFill>
-                  <a:schemeClr val="bg1"/>
-                </a:solidFill>
-                <a:latin typeface="Courier New" panose="02070309020205020404" pitchFamily="49" charset="0"/>
-                <a:cs typeface="Courier New" panose="02070309020205020404" pitchFamily="49" charset="0"/>
-              </a:rPr>
-              <a:t>}</a:t>
-            </a:r>
-          </a:p>
-          <a:p>
-            <a:pPr marL="0" indent="0">
-              <a:buNone/>
-            </a:pPr>
-            <a:endParaRPr lang="en-US" sz="1500" smtClean="0">
+            <a:endParaRPr lang="en-US" dirty="0">
               <a:solidFill>
                 <a:schemeClr val="bg1"/>
               </a:solidFill>
-              <a:latin typeface="Courier New" panose="02070309020205020404" pitchFamily="49" charset="0"/>
-              <a:cs typeface="Courier New" panose="02070309020205020404" pitchFamily="49" charset="0"/>
             </a:endParaRPr>
-          </a:p>
-          <a:p>
-            <a:pPr marL="0" indent="0">
-              <a:buNone/>
-            </a:pPr>
-            <a:r>
-              <a:rPr lang="en-US" sz="1500" dirty="0" smtClean="0">
-                <a:solidFill>
-                  <a:schemeClr val="bg1"/>
-                </a:solidFill>
-                <a:latin typeface="Courier New" panose="02070309020205020404" pitchFamily="49" charset="0"/>
-                <a:cs typeface="Courier New" panose="02070309020205020404" pitchFamily="49" charset="0"/>
-              </a:rPr>
-              <a:t>@media </a:t>
-            </a:r>
-            <a:r>
-              <a:rPr lang="en-US" sz="1500" dirty="0">
-                <a:solidFill>
-                  <a:schemeClr val="bg1"/>
-                </a:solidFill>
-                <a:latin typeface="Courier New" panose="02070309020205020404" pitchFamily="49" charset="0"/>
-                <a:cs typeface="Courier New" panose="02070309020205020404" pitchFamily="49" charset="0"/>
-              </a:rPr>
-              <a:t>(min-width: </a:t>
-            </a:r>
-            <a:r>
-              <a:rPr lang="en-US" sz="1500" dirty="0" smtClean="0">
-                <a:solidFill>
-                  <a:schemeClr val="bg1"/>
-                </a:solidFill>
-                <a:latin typeface="Courier New" panose="02070309020205020404" pitchFamily="49" charset="0"/>
-                <a:cs typeface="Courier New" panose="02070309020205020404" pitchFamily="49" charset="0"/>
-              </a:rPr>
-              <a:t>640px</a:t>
-            </a:r>
-            <a:r>
-              <a:rPr lang="en-US" sz="1500" dirty="0">
-                <a:solidFill>
-                  <a:schemeClr val="bg1"/>
-                </a:solidFill>
-                <a:latin typeface="Courier New" panose="02070309020205020404" pitchFamily="49" charset="0"/>
-                <a:cs typeface="Courier New" panose="02070309020205020404" pitchFamily="49" charset="0"/>
-              </a:rPr>
-              <a:t>) and (max-width: </a:t>
-            </a:r>
-            <a:r>
-              <a:rPr lang="en-US" sz="1500" dirty="0" smtClean="0">
-                <a:solidFill>
-                  <a:schemeClr val="bg1"/>
-                </a:solidFill>
-                <a:latin typeface="Courier New" panose="02070309020205020404" pitchFamily="49" charset="0"/>
-                <a:cs typeface="Courier New" panose="02070309020205020404" pitchFamily="49" charset="0"/>
-              </a:rPr>
-              <a:t>960px</a:t>
-            </a:r>
-            <a:r>
-              <a:rPr lang="en-US" sz="1500" dirty="0">
-                <a:solidFill>
-                  <a:schemeClr val="bg1"/>
-                </a:solidFill>
-                <a:latin typeface="Courier New" panose="02070309020205020404" pitchFamily="49" charset="0"/>
-                <a:cs typeface="Courier New" panose="02070309020205020404" pitchFamily="49" charset="0"/>
-              </a:rPr>
-              <a:t>) {</a:t>
-            </a:r>
-          </a:p>
-          <a:p>
-            <a:pPr marL="0" indent="0">
-              <a:buNone/>
-            </a:pPr>
-            <a:r>
-              <a:rPr lang="en-US" sz="1500" dirty="0" smtClean="0">
-                <a:solidFill>
-                  <a:schemeClr val="bg1"/>
-                </a:solidFill>
-                <a:latin typeface="Courier New" panose="02070309020205020404" pitchFamily="49" charset="0"/>
-                <a:cs typeface="Courier New" panose="02070309020205020404" pitchFamily="49" charset="0"/>
-              </a:rPr>
-              <a:t>    </a:t>
-            </a:r>
-            <a:r>
-              <a:rPr lang="en-US" sz="1500" dirty="0" err="1" smtClean="0">
-                <a:solidFill>
-                  <a:schemeClr val="bg1"/>
-                </a:solidFill>
-                <a:latin typeface="Courier New" panose="02070309020205020404" pitchFamily="49" charset="0"/>
-                <a:cs typeface="Courier New" panose="02070309020205020404" pitchFamily="49" charset="0"/>
-              </a:rPr>
-              <a:t>nav</a:t>
-            </a:r>
-            <a:r>
-              <a:rPr lang="en-US" sz="1500" dirty="0" smtClean="0">
-                <a:solidFill>
-                  <a:schemeClr val="bg1"/>
-                </a:solidFill>
-                <a:latin typeface="Courier New" panose="02070309020205020404" pitchFamily="49" charset="0"/>
-                <a:cs typeface="Courier New" panose="02070309020205020404" pitchFamily="49" charset="0"/>
-              </a:rPr>
-              <a:t> {</a:t>
-            </a:r>
-          </a:p>
-          <a:p>
-            <a:pPr marL="0" indent="0">
-              <a:buNone/>
-            </a:pPr>
-            <a:r>
-              <a:rPr lang="en-US" sz="1500" dirty="0">
-                <a:solidFill>
-                  <a:schemeClr val="bg1"/>
-                </a:solidFill>
-                <a:latin typeface="Courier New" panose="02070309020205020404" pitchFamily="49" charset="0"/>
-                <a:cs typeface="Courier New" panose="02070309020205020404" pitchFamily="49" charset="0"/>
-              </a:rPr>
-              <a:t> </a:t>
-            </a:r>
-            <a:r>
-              <a:rPr lang="en-US" sz="1500" dirty="0" smtClean="0">
-                <a:solidFill>
-                  <a:schemeClr val="bg1"/>
-                </a:solidFill>
-                <a:latin typeface="Courier New" panose="02070309020205020404" pitchFamily="49" charset="0"/>
-                <a:cs typeface="Courier New" panose="02070309020205020404" pitchFamily="49" charset="0"/>
-              </a:rPr>
-              <a:t>       display: none;</a:t>
-            </a:r>
-          </a:p>
-          <a:p>
-            <a:pPr marL="0" indent="0">
-              <a:buNone/>
-            </a:pPr>
-            <a:r>
-              <a:rPr lang="en-US" sz="1500" dirty="0" smtClean="0">
-                <a:solidFill>
-                  <a:schemeClr val="bg1"/>
-                </a:solidFill>
-                <a:latin typeface="Courier New" panose="02070309020205020404" pitchFamily="49" charset="0"/>
-                <a:cs typeface="Courier New" panose="02070309020205020404" pitchFamily="49" charset="0"/>
-              </a:rPr>
-              <a:t>    }</a:t>
-            </a:r>
-          </a:p>
-          <a:p>
-            <a:pPr marL="0" indent="0">
-              <a:buNone/>
-            </a:pPr>
-            <a:r>
-              <a:rPr lang="en-US" sz="1500" dirty="0" smtClean="0">
-                <a:solidFill>
-                  <a:schemeClr val="bg1"/>
-                </a:solidFill>
-                <a:latin typeface="Courier New" panose="02070309020205020404" pitchFamily="49" charset="0"/>
-                <a:cs typeface="Courier New" panose="02070309020205020404" pitchFamily="49" charset="0"/>
-              </a:rPr>
-              <a:t>}</a:t>
-            </a:r>
-          </a:p>
-          <a:p>
-            <a:pPr marL="0" indent="0">
-              <a:buNone/>
-            </a:pPr>
-            <a:r>
-              <a:rPr lang="en-US" sz="1500" dirty="0" err="1">
-                <a:solidFill>
-                  <a:schemeClr val="bg1"/>
-                </a:solidFill>
-                <a:latin typeface="Courier New" panose="02070309020205020404" pitchFamily="49" charset="0"/>
-                <a:cs typeface="Courier New" panose="02070309020205020404" pitchFamily="49" charset="0"/>
-              </a:rPr>
-              <a:t>img</a:t>
-            </a:r>
-            <a:r>
-              <a:rPr lang="en-US" sz="1500" dirty="0">
-                <a:solidFill>
-                  <a:schemeClr val="bg1"/>
-                </a:solidFill>
-                <a:latin typeface="Courier New" panose="02070309020205020404" pitchFamily="49" charset="0"/>
-                <a:cs typeface="Courier New" panose="02070309020205020404" pitchFamily="49" charset="0"/>
-              </a:rPr>
-              <a:t> { max-width: 100%; height: auto; }</a:t>
-            </a:r>
           </a:p>
         </p:txBody>
       </p:sp>
     </p:spTree>
     <p:extLst>
       <p:ext uri="{BB962C8B-B14F-4D97-AF65-F5344CB8AC3E}">
-        <p14:creationId xmlns:p14="http://schemas.microsoft.com/office/powerpoint/2010/main" val="2981051020"/>
+        <p14:creationId xmlns:p14="http://schemas.microsoft.com/office/powerpoint/2010/main" val="1648121178"/>
       </p:ext>
     </p:extLst>
   </p:cSld>

</xml_diff>